<commit_message>
Lots of mark downs and presentation outline
</commit_message>
<xml_diff>
--- a/presentation.pptx
+++ b/presentation.pptx
@@ -5,14 +5,30 @@
     <p:sldMasterId id="2147483648" r:id="rId1"/>
   </p:sldMasterIdLst>
   <p:notesMasterIdLst>
-    <p:notesMasterId r:id="rId7"/>
+    <p:notesMasterId r:id="rId23"/>
   </p:notesMasterIdLst>
   <p:sldIdLst>
     <p:sldId id="256" r:id="rId2"/>
     <p:sldId id="257" r:id="rId3"/>
     <p:sldId id="258" r:id="rId4"/>
-    <p:sldId id="259" r:id="rId5"/>
-    <p:sldId id="260" r:id="rId6"/>
+    <p:sldId id="264" r:id="rId5"/>
+    <p:sldId id="261" r:id="rId6"/>
+    <p:sldId id="263" r:id="rId7"/>
+    <p:sldId id="265" r:id="rId8"/>
+    <p:sldId id="262" r:id="rId9"/>
+    <p:sldId id="266" r:id="rId10"/>
+    <p:sldId id="267" r:id="rId11"/>
+    <p:sldId id="268" r:id="rId12"/>
+    <p:sldId id="271" r:id="rId13"/>
+    <p:sldId id="269" r:id="rId14"/>
+    <p:sldId id="273" r:id="rId15"/>
+    <p:sldId id="270" r:id="rId16"/>
+    <p:sldId id="274" r:id="rId17"/>
+    <p:sldId id="275" r:id="rId18"/>
+    <p:sldId id="276" r:id="rId19"/>
+    <p:sldId id="277" r:id="rId20"/>
+    <p:sldId id="259" r:id="rId21"/>
+    <p:sldId id="260" r:id="rId22"/>
   </p:sldIdLst>
   <p:sldSz cx="12192000" cy="6858000"/>
   <p:notesSz cx="6858000" cy="9144000"/>
@@ -111,6 +127,14 @@
       </a:defRPr>
     </a:lvl9pPr>
   </p:defaultTextStyle>
+  <p:extLst>
+    <p:ext uri="{EFAFB233-063F-42B5-8137-9DF3F51BA10A}">
+      <p15:sldGuideLst xmlns:p15="http://schemas.microsoft.com/office/powerpoint/2012/main"/>
+    </p:ext>
+    <p:ext uri="{2D200454-40CA-4A62-9FC3-DE9A4176ACB9}">
+      <p15:notesGuideLst xmlns:p15="http://schemas.microsoft.com/office/powerpoint/2012/main"/>
+    </p:ext>
+  </p:extLst>
 </p:presentation>
 </file>
 
@@ -196,7 +220,7 @@
           <a:p>
             <a:fld id="{B72CCB43-93CC-4D9A-B1A7-BFC1DBB69676}" type="datetimeFigureOut">
               <a:rPr lang="de-DE" smtClean="0"/>
-              <a:t>24.10.2023</a:t>
+              <a:t>30.10.2023</a:t>
             </a:fld>
             <a:endParaRPr lang="de-DE" dirty="0"/>
           </a:p>
@@ -3887,6 +3911,2198 @@
 </p:sld>
 </file>
 
+<file path=ppt/slides/slide10.xml><?xml version="1.0" encoding="utf-8"?>
+<p:sld xmlns:a="http://schemas.openxmlformats.org/drawingml/2006/main" xmlns:r="http://schemas.openxmlformats.org/officeDocument/2006/relationships" xmlns:p="http://schemas.openxmlformats.org/presentationml/2006/main">
+  <p:cSld>
+    <p:spTree>
+      <p:nvGrpSpPr>
+        <p:cNvPr id="1" name=""/>
+        <p:cNvGrpSpPr/>
+        <p:nvPr/>
+      </p:nvGrpSpPr>
+      <p:grpSpPr>
+        <a:xfrm>
+          <a:off x="0" y="0"/>
+          <a:ext cx="0" cy="0"/>
+          <a:chOff x="0" y="0"/>
+          <a:chExt cx="0" cy="0"/>
+        </a:xfrm>
+      </p:grpSpPr>
+      <p:sp>
+        <p:nvSpPr>
+          <p:cNvPr id="2" name="Titel 1">
+            <a:extLst>
+              <a:ext uri="{FF2B5EF4-FFF2-40B4-BE49-F238E27FC236}">
+                <a16:creationId xmlns:a16="http://schemas.microsoft.com/office/drawing/2014/main" id="{6452F334-F080-DBB0-A268-9394B43DEBA8}"/>
+              </a:ext>
+            </a:extLst>
+          </p:cNvPr>
+          <p:cNvSpPr>
+            <a:spLocks noGrp="1"/>
+          </p:cNvSpPr>
+          <p:nvPr>
+            <p:ph type="title"/>
+          </p:nvPr>
+        </p:nvSpPr>
+        <p:spPr/>
+        <p:txBody>
+          <a:bodyPr/>
+          <a:lstStyle/>
+          <a:p>
+            <a:r>
+              <a:rPr lang="de-DE" dirty="0"/>
+              <a:t>Evaluation Methods</a:t>
+            </a:r>
+          </a:p>
+        </p:txBody>
+      </p:sp>
+      <p:sp>
+        <p:nvSpPr>
+          <p:cNvPr id="3" name="Inhaltsplatzhalter 2">
+            <a:extLst>
+              <a:ext uri="{FF2B5EF4-FFF2-40B4-BE49-F238E27FC236}">
+                <a16:creationId xmlns:a16="http://schemas.microsoft.com/office/drawing/2014/main" id="{0BC14114-1E13-5B1E-5A43-0BB83E17C6F1}"/>
+              </a:ext>
+            </a:extLst>
+          </p:cNvPr>
+          <p:cNvSpPr>
+            <a:spLocks noGrp="1"/>
+          </p:cNvSpPr>
+          <p:nvPr>
+            <p:ph idx="1"/>
+          </p:nvPr>
+        </p:nvSpPr>
+        <p:spPr/>
+        <p:txBody>
+          <a:bodyPr/>
+          <a:lstStyle/>
+          <a:p>
+            <a:endParaRPr lang="de-DE" dirty="0"/>
+          </a:p>
+        </p:txBody>
+      </p:sp>
+      <p:sp>
+        <p:nvSpPr>
+          <p:cNvPr id="4" name="Datumsplatzhalter 3">
+            <a:extLst>
+              <a:ext uri="{FF2B5EF4-FFF2-40B4-BE49-F238E27FC236}">
+                <a16:creationId xmlns:a16="http://schemas.microsoft.com/office/drawing/2014/main" id="{F497F52B-AAC9-8C16-F110-59A289D079D0}"/>
+              </a:ext>
+            </a:extLst>
+          </p:cNvPr>
+          <p:cNvSpPr>
+            <a:spLocks noGrp="1"/>
+          </p:cNvSpPr>
+          <p:nvPr>
+            <p:ph type="dt" sz="half" idx="10"/>
+          </p:nvPr>
+        </p:nvSpPr>
+        <p:spPr/>
+        <p:txBody>
+          <a:bodyPr/>
+          <a:lstStyle/>
+          <a:p>
+            <a:r>
+              <a:rPr lang="de-DE"/>
+              <a:t>05.12.2023</a:t>
+            </a:r>
+            <a:endParaRPr lang="de-DE" dirty="0"/>
+          </a:p>
+        </p:txBody>
+      </p:sp>
+      <p:sp>
+        <p:nvSpPr>
+          <p:cNvPr id="5" name="Fußzeilenplatzhalter 4">
+            <a:extLst>
+              <a:ext uri="{FF2B5EF4-FFF2-40B4-BE49-F238E27FC236}">
+                <a16:creationId xmlns:a16="http://schemas.microsoft.com/office/drawing/2014/main" id="{E2506B73-B077-24FB-9352-AF165E90D6F8}"/>
+              </a:ext>
+            </a:extLst>
+          </p:cNvPr>
+          <p:cNvSpPr>
+            <a:spLocks noGrp="1"/>
+          </p:cNvSpPr>
+          <p:nvPr>
+            <p:ph type="ftr" sz="quarter" idx="11"/>
+          </p:nvPr>
+        </p:nvSpPr>
+        <p:spPr/>
+        <p:txBody>
+          <a:bodyPr/>
+          <a:lstStyle/>
+          <a:p>
+            <a:r>
+              <a:rPr lang="en-US"/>
+              <a:t>Multi-modal Speech Representation Learning</a:t>
+            </a:r>
+            <a:endParaRPr lang="de-DE" dirty="0"/>
+          </a:p>
+        </p:txBody>
+      </p:sp>
+      <p:sp>
+        <p:nvSpPr>
+          <p:cNvPr id="6" name="Foliennummernplatzhalter 5">
+            <a:extLst>
+              <a:ext uri="{FF2B5EF4-FFF2-40B4-BE49-F238E27FC236}">
+                <a16:creationId xmlns:a16="http://schemas.microsoft.com/office/drawing/2014/main" id="{7B25BD66-92E0-A4B6-E1D3-EF8C9DE64E7E}"/>
+              </a:ext>
+            </a:extLst>
+          </p:cNvPr>
+          <p:cNvSpPr>
+            <a:spLocks noGrp="1"/>
+          </p:cNvSpPr>
+          <p:nvPr>
+            <p:ph type="sldNum" sz="quarter" idx="12"/>
+          </p:nvPr>
+        </p:nvSpPr>
+        <p:spPr/>
+        <p:txBody>
+          <a:bodyPr/>
+          <a:lstStyle/>
+          <a:p>
+            <a:fld id="{4589C08E-11F1-4614-AD94-2F79D605AB8D}" type="slidenum">
+              <a:rPr lang="de-DE" smtClean="0"/>
+              <a:t>10</a:t>
+            </a:fld>
+            <a:endParaRPr lang="de-DE" dirty="0"/>
+          </a:p>
+        </p:txBody>
+      </p:sp>
+    </p:spTree>
+    <p:extLst>
+      <p:ext uri="{BB962C8B-B14F-4D97-AF65-F5344CB8AC3E}">
+        <p14:creationId xmlns:p14="http://schemas.microsoft.com/office/powerpoint/2010/main" val="1967141980"/>
+      </p:ext>
+    </p:extLst>
+  </p:cSld>
+  <p:clrMapOvr>
+    <a:masterClrMapping/>
+  </p:clrMapOvr>
+</p:sld>
+</file>
+
+<file path=ppt/slides/slide11.xml><?xml version="1.0" encoding="utf-8"?>
+<p:sld xmlns:a="http://schemas.openxmlformats.org/drawingml/2006/main" xmlns:r="http://schemas.openxmlformats.org/officeDocument/2006/relationships" xmlns:p="http://schemas.openxmlformats.org/presentationml/2006/main">
+  <p:cSld>
+    <p:spTree>
+      <p:nvGrpSpPr>
+        <p:cNvPr id="1" name=""/>
+        <p:cNvGrpSpPr/>
+        <p:nvPr/>
+      </p:nvGrpSpPr>
+      <p:grpSpPr>
+        <a:xfrm>
+          <a:off x="0" y="0"/>
+          <a:ext cx="0" cy="0"/>
+          <a:chOff x="0" y="0"/>
+          <a:chExt cx="0" cy="0"/>
+        </a:xfrm>
+      </p:grpSpPr>
+      <p:sp>
+        <p:nvSpPr>
+          <p:cNvPr id="2" name="Titel 1">
+            <a:extLst>
+              <a:ext uri="{FF2B5EF4-FFF2-40B4-BE49-F238E27FC236}">
+                <a16:creationId xmlns:a16="http://schemas.microsoft.com/office/drawing/2014/main" id="{50D04423-9DD4-F6BA-2DC9-5D0829C9B98C}"/>
+              </a:ext>
+            </a:extLst>
+          </p:cNvPr>
+          <p:cNvSpPr>
+            <a:spLocks noGrp="1"/>
+          </p:cNvSpPr>
+          <p:nvPr>
+            <p:ph type="title"/>
+          </p:nvPr>
+        </p:nvSpPr>
+        <p:spPr/>
+        <p:txBody>
+          <a:bodyPr/>
+          <a:lstStyle/>
+          <a:p>
+            <a:r>
+              <a:rPr lang="de-DE" dirty="0"/>
+              <a:t>AV-</a:t>
+            </a:r>
+            <a:r>
+              <a:rPr lang="de-DE" dirty="0" err="1"/>
+              <a:t>HuBERT</a:t>
+            </a:r>
+            <a:r>
+              <a:rPr lang="de-DE" dirty="0"/>
+              <a:t> (2022/03)</a:t>
+            </a:r>
+          </a:p>
+        </p:txBody>
+      </p:sp>
+      <p:sp>
+        <p:nvSpPr>
+          <p:cNvPr id="3" name="Inhaltsplatzhalter 2">
+            <a:extLst>
+              <a:ext uri="{FF2B5EF4-FFF2-40B4-BE49-F238E27FC236}">
+                <a16:creationId xmlns:a16="http://schemas.microsoft.com/office/drawing/2014/main" id="{FDD85934-B3B6-E0EF-C5FA-FDB5E52BA311}"/>
+              </a:ext>
+            </a:extLst>
+          </p:cNvPr>
+          <p:cNvSpPr>
+            <a:spLocks noGrp="1"/>
+          </p:cNvSpPr>
+          <p:nvPr>
+            <p:ph idx="1"/>
+          </p:nvPr>
+        </p:nvSpPr>
+        <p:spPr/>
+        <p:txBody>
+          <a:bodyPr/>
+          <a:lstStyle/>
+          <a:p>
+            <a:r>
+              <a:rPr lang="de-DE" dirty="0" err="1"/>
+              <a:t>Based</a:t>
+            </a:r>
+            <a:r>
+              <a:rPr lang="de-DE" dirty="0"/>
+              <a:t> on </a:t>
+            </a:r>
+            <a:r>
+              <a:rPr lang="de-DE" dirty="0" err="1"/>
+              <a:t>HuBERT</a:t>
+            </a:r>
+            <a:r>
+              <a:rPr lang="de-DE" dirty="0"/>
+              <a:t> (2106.07447)</a:t>
+            </a:r>
+          </a:p>
+          <a:p>
+            <a:r>
+              <a:rPr lang="de-DE" dirty="0"/>
+              <a:t>Audio and Visual </a:t>
+            </a:r>
+            <a:r>
+              <a:rPr lang="de-DE" dirty="0" err="1"/>
+              <a:t>channels</a:t>
+            </a:r>
+            <a:endParaRPr lang="de-DE" dirty="0"/>
+          </a:p>
+          <a:p>
+            <a:endParaRPr lang="de-DE" dirty="0"/>
+          </a:p>
+        </p:txBody>
+      </p:sp>
+      <p:sp>
+        <p:nvSpPr>
+          <p:cNvPr id="4" name="Datumsplatzhalter 3">
+            <a:extLst>
+              <a:ext uri="{FF2B5EF4-FFF2-40B4-BE49-F238E27FC236}">
+                <a16:creationId xmlns:a16="http://schemas.microsoft.com/office/drawing/2014/main" id="{0EFF3519-5645-AC9C-2AC3-70C6A68E499D}"/>
+              </a:ext>
+            </a:extLst>
+          </p:cNvPr>
+          <p:cNvSpPr>
+            <a:spLocks noGrp="1"/>
+          </p:cNvSpPr>
+          <p:nvPr>
+            <p:ph type="dt" sz="half" idx="10"/>
+          </p:nvPr>
+        </p:nvSpPr>
+        <p:spPr/>
+        <p:txBody>
+          <a:bodyPr/>
+          <a:lstStyle/>
+          <a:p>
+            <a:r>
+              <a:rPr lang="de-DE"/>
+              <a:t>05.12.2023</a:t>
+            </a:r>
+            <a:endParaRPr lang="de-DE" dirty="0"/>
+          </a:p>
+        </p:txBody>
+      </p:sp>
+      <p:sp>
+        <p:nvSpPr>
+          <p:cNvPr id="5" name="Fußzeilenplatzhalter 4">
+            <a:extLst>
+              <a:ext uri="{FF2B5EF4-FFF2-40B4-BE49-F238E27FC236}">
+                <a16:creationId xmlns:a16="http://schemas.microsoft.com/office/drawing/2014/main" id="{BF312A83-83AC-9C68-95FC-E7A6D59D3BB4}"/>
+              </a:ext>
+            </a:extLst>
+          </p:cNvPr>
+          <p:cNvSpPr>
+            <a:spLocks noGrp="1"/>
+          </p:cNvSpPr>
+          <p:nvPr>
+            <p:ph type="ftr" sz="quarter" idx="11"/>
+          </p:nvPr>
+        </p:nvSpPr>
+        <p:spPr/>
+        <p:txBody>
+          <a:bodyPr/>
+          <a:lstStyle/>
+          <a:p>
+            <a:r>
+              <a:rPr lang="en-US"/>
+              <a:t>Multi-modal Speech Representation Learning</a:t>
+            </a:r>
+            <a:endParaRPr lang="de-DE" dirty="0"/>
+          </a:p>
+        </p:txBody>
+      </p:sp>
+      <p:sp>
+        <p:nvSpPr>
+          <p:cNvPr id="6" name="Foliennummernplatzhalter 5">
+            <a:extLst>
+              <a:ext uri="{FF2B5EF4-FFF2-40B4-BE49-F238E27FC236}">
+                <a16:creationId xmlns:a16="http://schemas.microsoft.com/office/drawing/2014/main" id="{E525FE09-F039-617D-9C2B-891727A4B0B4}"/>
+              </a:ext>
+            </a:extLst>
+          </p:cNvPr>
+          <p:cNvSpPr>
+            <a:spLocks noGrp="1"/>
+          </p:cNvSpPr>
+          <p:nvPr>
+            <p:ph type="sldNum" sz="quarter" idx="12"/>
+          </p:nvPr>
+        </p:nvSpPr>
+        <p:spPr/>
+        <p:txBody>
+          <a:bodyPr/>
+          <a:lstStyle/>
+          <a:p>
+            <a:fld id="{4589C08E-11F1-4614-AD94-2F79D605AB8D}" type="slidenum">
+              <a:rPr lang="de-DE" smtClean="0"/>
+              <a:t>11</a:t>
+            </a:fld>
+            <a:endParaRPr lang="de-DE" dirty="0"/>
+          </a:p>
+        </p:txBody>
+      </p:sp>
+    </p:spTree>
+    <p:extLst>
+      <p:ext uri="{BB962C8B-B14F-4D97-AF65-F5344CB8AC3E}">
+        <p14:creationId xmlns:p14="http://schemas.microsoft.com/office/powerpoint/2010/main" val="2506345323"/>
+      </p:ext>
+    </p:extLst>
+  </p:cSld>
+  <p:clrMapOvr>
+    <a:masterClrMapping/>
+  </p:clrMapOvr>
+</p:sld>
+</file>
+
+<file path=ppt/slides/slide12.xml><?xml version="1.0" encoding="utf-8"?>
+<p:sld xmlns:a="http://schemas.openxmlformats.org/drawingml/2006/main" xmlns:r="http://schemas.openxmlformats.org/officeDocument/2006/relationships" xmlns:p="http://schemas.openxmlformats.org/presentationml/2006/main">
+  <p:cSld>
+    <p:spTree>
+      <p:nvGrpSpPr>
+        <p:cNvPr id="1" name=""/>
+        <p:cNvGrpSpPr/>
+        <p:nvPr/>
+      </p:nvGrpSpPr>
+      <p:grpSpPr>
+        <a:xfrm>
+          <a:off x="0" y="0"/>
+          <a:ext cx="0" cy="0"/>
+          <a:chOff x="0" y="0"/>
+          <a:chExt cx="0" cy="0"/>
+        </a:xfrm>
+      </p:grpSpPr>
+      <p:sp>
+        <p:nvSpPr>
+          <p:cNvPr id="2" name="Titel 1">
+            <a:extLst>
+              <a:ext uri="{FF2B5EF4-FFF2-40B4-BE49-F238E27FC236}">
+                <a16:creationId xmlns:a16="http://schemas.microsoft.com/office/drawing/2014/main" id="{50D04423-9DD4-F6BA-2DC9-5D0829C9B98C}"/>
+              </a:ext>
+            </a:extLst>
+          </p:cNvPr>
+          <p:cNvSpPr>
+            <a:spLocks noGrp="1"/>
+          </p:cNvSpPr>
+          <p:nvPr>
+            <p:ph type="title"/>
+          </p:nvPr>
+        </p:nvSpPr>
+        <p:spPr/>
+        <p:txBody>
+          <a:bodyPr/>
+          <a:lstStyle/>
+          <a:p>
+            <a:r>
+              <a:rPr lang="de-DE" dirty="0"/>
+              <a:t>AV-</a:t>
+            </a:r>
+            <a:r>
+              <a:rPr lang="de-DE" dirty="0" err="1"/>
+              <a:t>HuBERT</a:t>
+            </a:r>
+            <a:r>
+              <a:rPr lang="de-DE" dirty="0"/>
+              <a:t> (2022/03)</a:t>
+            </a:r>
+          </a:p>
+        </p:txBody>
+      </p:sp>
+      <p:sp>
+        <p:nvSpPr>
+          <p:cNvPr id="3" name="Inhaltsplatzhalter 2">
+            <a:extLst>
+              <a:ext uri="{FF2B5EF4-FFF2-40B4-BE49-F238E27FC236}">
+                <a16:creationId xmlns:a16="http://schemas.microsoft.com/office/drawing/2014/main" id="{FDD85934-B3B6-E0EF-C5FA-FDB5E52BA311}"/>
+              </a:ext>
+            </a:extLst>
+          </p:cNvPr>
+          <p:cNvSpPr>
+            <a:spLocks noGrp="1"/>
+          </p:cNvSpPr>
+          <p:nvPr>
+            <p:ph idx="1"/>
+          </p:nvPr>
+        </p:nvSpPr>
+        <p:spPr/>
+        <p:txBody>
+          <a:bodyPr/>
+          <a:lstStyle/>
+          <a:p>
+            <a:r>
+              <a:rPr lang="de-DE" dirty="0"/>
+              <a:t>Scores in ASR/…</a:t>
+            </a:r>
+          </a:p>
+          <a:p>
+            <a:endParaRPr lang="de-DE" dirty="0"/>
+          </a:p>
+        </p:txBody>
+      </p:sp>
+      <p:sp>
+        <p:nvSpPr>
+          <p:cNvPr id="4" name="Datumsplatzhalter 3">
+            <a:extLst>
+              <a:ext uri="{FF2B5EF4-FFF2-40B4-BE49-F238E27FC236}">
+                <a16:creationId xmlns:a16="http://schemas.microsoft.com/office/drawing/2014/main" id="{0EFF3519-5645-AC9C-2AC3-70C6A68E499D}"/>
+              </a:ext>
+            </a:extLst>
+          </p:cNvPr>
+          <p:cNvSpPr>
+            <a:spLocks noGrp="1"/>
+          </p:cNvSpPr>
+          <p:nvPr>
+            <p:ph type="dt" sz="half" idx="10"/>
+          </p:nvPr>
+        </p:nvSpPr>
+        <p:spPr/>
+        <p:txBody>
+          <a:bodyPr/>
+          <a:lstStyle/>
+          <a:p>
+            <a:r>
+              <a:rPr lang="de-DE"/>
+              <a:t>05.12.2023</a:t>
+            </a:r>
+            <a:endParaRPr lang="de-DE" dirty="0"/>
+          </a:p>
+        </p:txBody>
+      </p:sp>
+      <p:sp>
+        <p:nvSpPr>
+          <p:cNvPr id="5" name="Fußzeilenplatzhalter 4">
+            <a:extLst>
+              <a:ext uri="{FF2B5EF4-FFF2-40B4-BE49-F238E27FC236}">
+                <a16:creationId xmlns:a16="http://schemas.microsoft.com/office/drawing/2014/main" id="{BF312A83-83AC-9C68-95FC-E7A6D59D3BB4}"/>
+              </a:ext>
+            </a:extLst>
+          </p:cNvPr>
+          <p:cNvSpPr>
+            <a:spLocks noGrp="1"/>
+          </p:cNvSpPr>
+          <p:nvPr>
+            <p:ph type="ftr" sz="quarter" idx="11"/>
+          </p:nvPr>
+        </p:nvSpPr>
+        <p:spPr/>
+        <p:txBody>
+          <a:bodyPr/>
+          <a:lstStyle/>
+          <a:p>
+            <a:r>
+              <a:rPr lang="en-US"/>
+              <a:t>Multi-modal Speech Representation Learning</a:t>
+            </a:r>
+            <a:endParaRPr lang="de-DE" dirty="0"/>
+          </a:p>
+        </p:txBody>
+      </p:sp>
+      <p:sp>
+        <p:nvSpPr>
+          <p:cNvPr id="6" name="Foliennummernplatzhalter 5">
+            <a:extLst>
+              <a:ext uri="{FF2B5EF4-FFF2-40B4-BE49-F238E27FC236}">
+                <a16:creationId xmlns:a16="http://schemas.microsoft.com/office/drawing/2014/main" id="{E525FE09-F039-617D-9C2B-891727A4B0B4}"/>
+              </a:ext>
+            </a:extLst>
+          </p:cNvPr>
+          <p:cNvSpPr>
+            <a:spLocks noGrp="1"/>
+          </p:cNvSpPr>
+          <p:nvPr>
+            <p:ph type="sldNum" sz="quarter" idx="12"/>
+          </p:nvPr>
+        </p:nvSpPr>
+        <p:spPr/>
+        <p:txBody>
+          <a:bodyPr/>
+          <a:lstStyle/>
+          <a:p>
+            <a:fld id="{4589C08E-11F1-4614-AD94-2F79D605AB8D}" type="slidenum">
+              <a:rPr lang="de-DE" smtClean="0"/>
+              <a:t>12</a:t>
+            </a:fld>
+            <a:endParaRPr lang="de-DE" dirty="0"/>
+          </a:p>
+        </p:txBody>
+      </p:sp>
+    </p:spTree>
+    <p:extLst>
+      <p:ext uri="{BB962C8B-B14F-4D97-AF65-F5344CB8AC3E}">
+        <p14:creationId xmlns:p14="http://schemas.microsoft.com/office/powerpoint/2010/main" val="1880602538"/>
+      </p:ext>
+    </p:extLst>
+  </p:cSld>
+  <p:clrMapOvr>
+    <a:masterClrMapping/>
+  </p:clrMapOvr>
+</p:sld>
+</file>
+
+<file path=ppt/slides/slide13.xml><?xml version="1.0" encoding="utf-8"?>
+<p:sld xmlns:a="http://schemas.openxmlformats.org/drawingml/2006/main" xmlns:r="http://schemas.openxmlformats.org/officeDocument/2006/relationships" xmlns:p="http://schemas.openxmlformats.org/presentationml/2006/main">
+  <p:cSld>
+    <p:spTree>
+      <p:nvGrpSpPr>
+        <p:cNvPr id="1" name=""/>
+        <p:cNvGrpSpPr/>
+        <p:nvPr/>
+      </p:nvGrpSpPr>
+      <p:grpSpPr>
+        <a:xfrm>
+          <a:off x="0" y="0"/>
+          <a:ext cx="0" cy="0"/>
+          <a:chOff x="0" y="0"/>
+          <a:chExt cx="0" cy="0"/>
+        </a:xfrm>
+      </p:grpSpPr>
+      <p:sp>
+        <p:nvSpPr>
+          <p:cNvPr id="2" name="Titel 1">
+            <a:extLst>
+              <a:ext uri="{FF2B5EF4-FFF2-40B4-BE49-F238E27FC236}">
+                <a16:creationId xmlns:a16="http://schemas.microsoft.com/office/drawing/2014/main" id="{900237B8-8B96-DE96-EA74-C21807612AD9}"/>
+              </a:ext>
+            </a:extLst>
+          </p:cNvPr>
+          <p:cNvSpPr>
+            <a:spLocks noGrp="1"/>
+          </p:cNvSpPr>
+          <p:nvPr>
+            <p:ph type="title"/>
+          </p:nvPr>
+        </p:nvSpPr>
+        <p:spPr/>
+        <p:txBody>
+          <a:bodyPr/>
+          <a:lstStyle/>
+          <a:p>
+            <a:r>
+              <a:rPr lang="de-DE" dirty="0"/>
+              <a:t>SpeechT5 (2022/05)</a:t>
+            </a:r>
+          </a:p>
+        </p:txBody>
+      </p:sp>
+      <p:sp>
+        <p:nvSpPr>
+          <p:cNvPr id="3" name="Inhaltsplatzhalter 2">
+            <a:extLst>
+              <a:ext uri="{FF2B5EF4-FFF2-40B4-BE49-F238E27FC236}">
+                <a16:creationId xmlns:a16="http://schemas.microsoft.com/office/drawing/2014/main" id="{ADA39428-2238-5C4F-EA42-1FF1034AD083}"/>
+              </a:ext>
+            </a:extLst>
+          </p:cNvPr>
+          <p:cNvSpPr>
+            <a:spLocks noGrp="1"/>
+          </p:cNvSpPr>
+          <p:nvPr>
+            <p:ph idx="1"/>
+          </p:nvPr>
+        </p:nvSpPr>
+        <p:spPr/>
+        <p:txBody>
+          <a:bodyPr/>
+          <a:lstStyle/>
+          <a:p>
+            <a:r>
+              <a:rPr lang="de-DE" dirty="0"/>
+              <a:t>Speech/Text </a:t>
+            </a:r>
+            <a:r>
+              <a:rPr lang="de-DE" dirty="0" err="1"/>
+              <a:t>to</a:t>
+            </a:r>
+            <a:r>
+              <a:rPr lang="de-DE" dirty="0"/>
+              <a:t> Speech/Text </a:t>
+            </a:r>
+            <a:r>
+              <a:rPr lang="de-DE" dirty="0" err="1"/>
+              <a:t>learning</a:t>
+            </a:r>
+            <a:endParaRPr lang="de-DE" dirty="0"/>
+          </a:p>
+          <a:p>
+            <a:r>
+              <a:rPr lang="de-DE" dirty="0"/>
+              <a:t>Text/Speech </a:t>
+            </a:r>
+            <a:r>
+              <a:rPr lang="de-DE" dirty="0" err="1"/>
+              <a:t>input</a:t>
+            </a:r>
+            <a:r>
+              <a:rPr lang="de-DE" dirty="0"/>
+              <a:t> </a:t>
+            </a:r>
+            <a:r>
+              <a:rPr lang="de-DE" dirty="0" err="1"/>
+              <a:t>into</a:t>
+            </a:r>
+            <a:r>
+              <a:rPr lang="de-DE" dirty="0"/>
+              <a:t> same </a:t>
+            </a:r>
+            <a:r>
+              <a:rPr lang="de-DE" dirty="0" err="1"/>
+              <a:t>vector</a:t>
+            </a:r>
+            <a:r>
+              <a:rPr lang="de-DE" dirty="0"/>
+              <a:t> </a:t>
+            </a:r>
+            <a:r>
+              <a:rPr lang="de-DE" dirty="0" err="1"/>
+              <a:t>space</a:t>
+            </a:r>
+            <a:endParaRPr lang="de-DE" dirty="0"/>
+          </a:p>
+          <a:p>
+            <a:r>
+              <a:rPr lang="de-DE" dirty="0"/>
+              <a:t>Advantage: </a:t>
+            </a:r>
+            <a:r>
+              <a:rPr lang="de-DE" dirty="0" err="1"/>
+              <a:t>Pre</a:t>
+            </a:r>
+            <a:r>
+              <a:rPr lang="de-DE" dirty="0"/>
+              <a:t>-train on large </a:t>
+            </a:r>
+            <a:r>
+              <a:rPr lang="de-DE" dirty="0" err="1"/>
+              <a:t>amounts</a:t>
+            </a:r>
+            <a:r>
+              <a:rPr lang="de-DE" dirty="0"/>
+              <a:t> of </a:t>
+            </a:r>
+            <a:r>
+              <a:rPr lang="de-DE" dirty="0" err="1"/>
+              <a:t>unlabeled</a:t>
+            </a:r>
+            <a:r>
+              <a:rPr lang="de-DE" dirty="0"/>
+              <a:t> </a:t>
+            </a:r>
+            <a:r>
+              <a:rPr lang="de-DE" dirty="0" err="1"/>
+              <a:t>text</a:t>
+            </a:r>
+            <a:r>
+              <a:rPr lang="de-DE" dirty="0"/>
+              <a:t>/</a:t>
+            </a:r>
+            <a:r>
+              <a:rPr lang="de-DE" dirty="0" err="1"/>
+              <a:t>speech</a:t>
+            </a:r>
+            <a:r>
+              <a:rPr lang="de-DE" dirty="0"/>
+              <a:t> </a:t>
+            </a:r>
+            <a:r>
+              <a:rPr lang="de-DE" dirty="0" err="1"/>
+              <a:t>data</a:t>
+            </a:r>
+            <a:r>
+              <a:rPr lang="de-DE" dirty="0"/>
+              <a:t> (</a:t>
+            </a:r>
+            <a:r>
+              <a:rPr lang="de-DE" dirty="0" err="1"/>
+              <a:t>why</a:t>
+            </a:r>
+            <a:r>
+              <a:rPr lang="de-DE" dirty="0"/>
+              <a:t>)</a:t>
+            </a:r>
+          </a:p>
+        </p:txBody>
+      </p:sp>
+      <p:sp>
+        <p:nvSpPr>
+          <p:cNvPr id="4" name="Datumsplatzhalter 3">
+            <a:extLst>
+              <a:ext uri="{FF2B5EF4-FFF2-40B4-BE49-F238E27FC236}">
+                <a16:creationId xmlns:a16="http://schemas.microsoft.com/office/drawing/2014/main" id="{43045F5A-5F84-3DAA-D947-9CB10D10294A}"/>
+              </a:ext>
+            </a:extLst>
+          </p:cNvPr>
+          <p:cNvSpPr>
+            <a:spLocks noGrp="1"/>
+          </p:cNvSpPr>
+          <p:nvPr>
+            <p:ph type="dt" sz="half" idx="10"/>
+          </p:nvPr>
+        </p:nvSpPr>
+        <p:spPr/>
+        <p:txBody>
+          <a:bodyPr/>
+          <a:lstStyle/>
+          <a:p>
+            <a:r>
+              <a:rPr lang="de-DE"/>
+              <a:t>05.12.2023</a:t>
+            </a:r>
+            <a:endParaRPr lang="de-DE" dirty="0"/>
+          </a:p>
+        </p:txBody>
+      </p:sp>
+      <p:sp>
+        <p:nvSpPr>
+          <p:cNvPr id="5" name="Fußzeilenplatzhalter 4">
+            <a:extLst>
+              <a:ext uri="{FF2B5EF4-FFF2-40B4-BE49-F238E27FC236}">
+                <a16:creationId xmlns:a16="http://schemas.microsoft.com/office/drawing/2014/main" id="{EDE2E0EC-EE74-FA84-73F1-5E3DE571CEF0}"/>
+              </a:ext>
+            </a:extLst>
+          </p:cNvPr>
+          <p:cNvSpPr>
+            <a:spLocks noGrp="1"/>
+          </p:cNvSpPr>
+          <p:nvPr>
+            <p:ph type="ftr" sz="quarter" idx="11"/>
+          </p:nvPr>
+        </p:nvSpPr>
+        <p:spPr/>
+        <p:txBody>
+          <a:bodyPr/>
+          <a:lstStyle/>
+          <a:p>
+            <a:r>
+              <a:rPr lang="en-US"/>
+              <a:t>Multi-modal Speech Representation Learning</a:t>
+            </a:r>
+            <a:endParaRPr lang="de-DE" dirty="0"/>
+          </a:p>
+        </p:txBody>
+      </p:sp>
+      <p:sp>
+        <p:nvSpPr>
+          <p:cNvPr id="6" name="Foliennummernplatzhalter 5">
+            <a:extLst>
+              <a:ext uri="{FF2B5EF4-FFF2-40B4-BE49-F238E27FC236}">
+                <a16:creationId xmlns:a16="http://schemas.microsoft.com/office/drawing/2014/main" id="{D78DCF89-03A3-987E-DC00-E02C395B4493}"/>
+              </a:ext>
+            </a:extLst>
+          </p:cNvPr>
+          <p:cNvSpPr>
+            <a:spLocks noGrp="1"/>
+          </p:cNvSpPr>
+          <p:nvPr>
+            <p:ph type="sldNum" sz="quarter" idx="12"/>
+          </p:nvPr>
+        </p:nvSpPr>
+        <p:spPr/>
+        <p:txBody>
+          <a:bodyPr/>
+          <a:lstStyle/>
+          <a:p>
+            <a:fld id="{4589C08E-11F1-4614-AD94-2F79D605AB8D}" type="slidenum">
+              <a:rPr lang="de-DE" smtClean="0"/>
+              <a:t>13</a:t>
+            </a:fld>
+            <a:endParaRPr lang="de-DE" dirty="0"/>
+          </a:p>
+        </p:txBody>
+      </p:sp>
+    </p:spTree>
+    <p:extLst>
+      <p:ext uri="{BB962C8B-B14F-4D97-AF65-F5344CB8AC3E}">
+        <p14:creationId xmlns:p14="http://schemas.microsoft.com/office/powerpoint/2010/main" val="1261267913"/>
+      </p:ext>
+    </p:extLst>
+  </p:cSld>
+  <p:clrMapOvr>
+    <a:masterClrMapping/>
+  </p:clrMapOvr>
+</p:sld>
+</file>
+
+<file path=ppt/slides/slide14.xml><?xml version="1.0" encoding="utf-8"?>
+<p:sld xmlns:a="http://schemas.openxmlformats.org/drawingml/2006/main" xmlns:r="http://schemas.openxmlformats.org/officeDocument/2006/relationships" xmlns:p="http://schemas.openxmlformats.org/presentationml/2006/main">
+  <p:cSld>
+    <p:spTree>
+      <p:nvGrpSpPr>
+        <p:cNvPr id="1" name=""/>
+        <p:cNvGrpSpPr/>
+        <p:nvPr/>
+      </p:nvGrpSpPr>
+      <p:grpSpPr>
+        <a:xfrm>
+          <a:off x="0" y="0"/>
+          <a:ext cx="0" cy="0"/>
+          <a:chOff x="0" y="0"/>
+          <a:chExt cx="0" cy="0"/>
+        </a:xfrm>
+      </p:grpSpPr>
+      <p:sp>
+        <p:nvSpPr>
+          <p:cNvPr id="2" name="Titel 1">
+            <a:extLst>
+              <a:ext uri="{FF2B5EF4-FFF2-40B4-BE49-F238E27FC236}">
+                <a16:creationId xmlns:a16="http://schemas.microsoft.com/office/drawing/2014/main" id="{900237B8-8B96-DE96-EA74-C21807612AD9}"/>
+              </a:ext>
+            </a:extLst>
+          </p:cNvPr>
+          <p:cNvSpPr>
+            <a:spLocks noGrp="1"/>
+          </p:cNvSpPr>
+          <p:nvPr>
+            <p:ph type="title"/>
+          </p:nvPr>
+        </p:nvSpPr>
+        <p:spPr/>
+        <p:txBody>
+          <a:bodyPr/>
+          <a:lstStyle/>
+          <a:p>
+            <a:r>
+              <a:rPr lang="de-DE" dirty="0"/>
+              <a:t>SpeechT5 (2022/05)</a:t>
+            </a:r>
+          </a:p>
+        </p:txBody>
+      </p:sp>
+      <p:sp>
+        <p:nvSpPr>
+          <p:cNvPr id="3" name="Inhaltsplatzhalter 2">
+            <a:extLst>
+              <a:ext uri="{FF2B5EF4-FFF2-40B4-BE49-F238E27FC236}">
+                <a16:creationId xmlns:a16="http://schemas.microsoft.com/office/drawing/2014/main" id="{ADA39428-2238-5C4F-EA42-1FF1034AD083}"/>
+              </a:ext>
+            </a:extLst>
+          </p:cNvPr>
+          <p:cNvSpPr>
+            <a:spLocks noGrp="1"/>
+          </p:cNvSpPr>
+          <p:nvPr>
+            <p:ph idx="1"/>
+          </p:nvPr>
+        </p:nvSpPr>
+        <p:spPr/>
+        <p:txBody>
+          <a:bodyPr/>
+          <a:lstStyle/>
+          <a:p>
+            <a:r>
+              <a:rPr lang="de-DE" dirty="0"/>
+              <a:t>Scores, </a:t>
+            </a:r>
+            <a:r>
+              <a:rPr lang="de-DE" dirty="0" err="1"/>
+              <a:t>difference</a:t>
+            </a:r>
+            <a:r>
+              <a:rPr lang="de-DE" dirty="0"/>
+              <a:t> </a:t>
+            </a:r>
+            <a:r>
+              <a:rPr lang="de-DE" dirty="0" err="1"/>
+              <a:t>to</a:t>
+            </a:r>
+            <a:r>
+              <a:rPr lang="de-DE" dirty="0"/>
+              <a:t> AV-</a:t>
+            </a:r>
+            <a:r>
+              <a:rPr lang="de-DE" dirty="0" err="1"/>
+              <a:t>HuBERT</a:t>
+            </a:r>
+            <a:endParaRPr lang="de-DE" dirty="0"/>
+          </a:p>
+          <a:p>
+            <a:r>
+              <a:rPr lang="de-DE" dirty="0" err="1"/>
+              <a:t>Why</a:t>
+            </a:r>
+            <a:r>
+              <a:rPr lang="de-DE" dirty="0"/>
+              <a:t> </a:t>
+            </a:r>
+            <a:r>
+              <a:rPr lang="de-DE" dirty="0" err="1"/>
+              <a:t>does</a:t>
+            </a:r>
+            <a:r>
+              <a:rPr lang="de-DE" dirty="0"/>
+              <a:t> </a:t>
+            </a:r>
+            <a:r>
+              <a:rPr lang="de-DE" dirty="0" err="1"/>
+              <a:t>it</a:t>
+            </a:r>
+            <a:r>
+              <a:rPr lang="de-DE" dirty="0"/>
+              <a:t> </a:t>
+            </a:r>
+            <a:r>
+              <a:rPr lang="de-DE" dirty="0" err="1"/>
+              <a:t>work</a:t>
+            </a:r>
+            <a:r>
+              <a:rPr lang="de-DE" dirty="0"/>
+              <a:t> </a:t>
+            </a:r>
+            <a:r>
+              <a:rPr lang="de-DE" dirty="0" err="1"/>
+              <a:t>that</a:t>
+            </a:r>
+            <a:r>
+              <a:rPr lang="de-DE" dirty="0"/>
+              <a:t> </a:t>
+            </a:r>
+            <a:r>
+              <a:rPr lang="de-DE" dirty="0" err="1"/>
+              <a:t>well</a:t>
+            </a:r>
+            <a:r>
+              <a:rPr lang="de-DE" dirty="0"/>
+              <a:t>?</a:t>
+            </a:r>
+          </a:p>
+        </p:txBody>
+      </p:sp>
+      <p:sp>
+        <p:nvSpPr>
+          <p:cNvPr id="4" name="Datumsplatzhalter 3">
+            <a:extLst>
+              <a:ext uri="{FF2B5EF4-FFF2-40B4-BE49-F238E27FC236}">
+                <a16:creationId xmlns:a16="http://schemas.microsoft.com/office/drawing/2014/main" id="{43045F5A-5F84-3DAA-D947-9CB10D10294A}"/>
+              </a:ext>
+            </a:extLst>
+          </p:cNvPr>
+          <p:cNvSpPr>
+            <a:spLocks noGrp="1"/>
+          </p:cNvSpPr>
+          <p:nvPr>
+            <p:ph type="dt" sz="half" idx="10"/>
+          </p:nvPr>
+        </p:nvSpPr>
+        <p:spPr/>
+        <p:txBody>
+          <a:bodyPr/>
+          <a:lstStyle/>
+          <a:p>
+            <a:r>
+              <a:rPr lang="de-DE"/>
+              <a:t>05.12.2023</a:t>
+            </a:r>
+            <a:endParaRPr lang="de-DE" dirty="0"/>
+          </a:p>
+        </p:txBody>
+      </p:sp>
+      <p:sp>
+        <p:nvSpPr>
+          <p:cNvPr id="5" name="Fußzeilenplatzhalter 4">
+            <a:extLst>
+              <a:ext uri="{FF2B5EF4-FFF2-40B4-BE49-F238E27FC236}">
+                <a16:creationId xmlns:a16="http://schemas.microsoft.com/office/drawing/2014/main" id="{EDE2E0EC-EE74-FA84-73F1-5E3DE571CEF0}"/>
+              </a:ext>
+            </a:extLst>
+          </p:cNvPr>
+          <p:cNvSpPr>
+            <a:spLocks noGrp="1"/>
+          </p:cNvSpPr>
+          <p:nvPr>
+            <p:ph type="ftr" sz="quarter" idx="11"/>
+          </p:nvPr>
+        </p:nvSpPr>
+        <p:spPr/>
+        <p:txBody>
+          <a:bodyPr/>
+          <a:lstStyle/>
+          <a:p>
+            <a:r>
+              <a:rPr lang="en-US"/>
+              <a:t>Multi-modal Speech Representation Learning</a:t>
+            </a:r>
+            <a:endParaRPr lang="de-DE" dirty="0"/>
+          </a:p>
+        </p:txBody>
+      </p:sp>
+      <p:sp>
+        <p:nvSpPr>
+          <p:cNvPr id="6" name="Foliennummernplatzhalter 5">
+            <a:extLst>
+              <a:ext uri="{FF2B5EF4-FFF2-40B4-BE49-F238E27FC236}">
+                <a16:creationId xmlns:a16="http://schemas.microsoft.com/office/drawing/2014/main" id="{D78DCF89-03A3-987E-DC00-E02C395B4493}"/>
+              </a:ext>
+            </a:extLst>
+          </p:cNvPr>
+          <p:cNvSpPr>
+            <a:spLocks noGrp="1"/>
+          </p:cNvSpPr>
+          <p:nvPr>
+            <p:ph type="sldNum" sz="quarter" idx="12"/>
+          </p:nvPr>
+        </p:nvSpPr>
+        <p:spPr/>
+        <p:txBody>
+          <a:bodyPr/>
+          <a:lstStyle/>
+          <a:p>
+            <a:fld id="{4589C08E-11F1-4614-AD94-2F79D605AB8D}" type="slidenum">
+              <a:rPr lang="de-DE" smtClean="0"/>
+              <a:t>14</a:t>
+            </a:fld>
+            <a:endParaRPr lang="de-DE" dirty="0"/>
+          </a:p>
+        </p:txBody>
+      </p:sp>
+    </p:spTree>
+    <p:extLst>
+      <p:ext uri="{BB962C8B-B14F-4D97-AF65-F5344CB8AC3E}">
+        <p14:creationId xmlns:p14="http://schemas.microsoft.com/office/powerpoint/2010/main" val="2382043539"/>
+      </p:ext>
+    </p:extLst>
+  </p:cSld>
+  <p:clrMapOvr>
+    <a:masterClrMapping/>
+  </p:clrMapOvr>
+</p:sld>
+</file>
+
+<file path=ppt/slides/slide15.xml><?xml version="1.0" encoding="utf-8"?>
+<p:sld xmlns:a="http://schemas.openxmlformats.org/drawingml/2006/main" xmlns:r="http://schemas.openxmlformats.org/officeDocument/2006/relationships" xmlns:p="http://schemas.openxmlformats.org/presentationml/2006/main">
+  <p:cSld>
+    <p:spTree>
+      <p:nvGrpSpPr>
+        <p:cNvPr id="1" name=""/>
+        <p:cNvGrpSpPr/>
+        <p:nvPr/>
+      </p:nvGrpSpPr>
+      <p:grpSpPr>
+        <a:xfrm>
+          <a:off x="0" y="0"/>
+          <a:ext cx="0" cy="0"/>
+          <a:chOff x="0" y="0"/>
+          <a:chExt cx="0" cy="0"/>
+        </a:xfrm>
+      </p:grpSpPr>
+      <p:sp>
+        <p:nvSpPr>
+          <p:cNvPr id="2" name="Titel 1">
+            <a:extLst>
+              <a:ext uri="{FF2B5EF4-FFF2-40B4-BE49-F238E27FC236}">
+                <a16:creationId xmlns:a16="http://schemas.microsoft.com/office/drawing/2014/main" id="{358629DF-DE7D-BAA9-F837-194F89F9BC96}"/>
+              </a:ext>
+            </a:extLst>
+          </p:cNvPr>
+          <p:cNvSpPr>
+            <a:spLocks noGrp="1"/>
+          </p:cNvSpPr>
+          <p:nvPr>
+            <p:ph type="title"/>
+          </p:nvPr>
+        </p:nvSpPr>
+        <p:spPr/>
+        <p:txBody>
+          <a:bodyPr/>
+          <a:lstStyle/>
+          <a:p>
+            <a:r>
+              <a:rPr lang="de-DE" dirty="0"/>
+              <a:t>Visual-Audio-Text LM (2023/05)</a:t>
+            </a:r>
+          </a:p>
+        </p:txBody>
+      </p:sp>
+      <p:sp>
+        <p:nvSpPr>
+          <p:cNvPr id="3" name="Inhaltsplatzhalter 2">
+            <a:extLst>
+              <a:ext uri="{FF2B5EF4-FFF2-40B4-BE49-F238E27FC236}">
+                <a16:creationId xmlns:a16="http://schemas.microsoft.com/office/drawing/2014/main" id="{C122DCDD-7E10-B6E4-9A57-42E9DB86B263}"/>
+              </a:ext>
+            </a:extLst>
+          </p:cNvPr>
+          <p:cNvSpPr>
+            <a:spLocks noGrp="1"/>
+          </p:cNvSpPr>
+          <p:nvPr>
+            <p:ph idx="1"/>
+          </p:nvPr>
+        </p:nvSpPr>
+        <p:spPr/>
+        <p:txBody>
+          <a:bodyPr/>
+          <a:lstStyle/>
+          <a:p>
+            <a:r>
+              <a:rPr lang="de-DE" dirty="0"/>
+              <a:t>…</a:t>
+            </a:r>
+          </a:p>
+        </p:txBody>
+      </p:sp>
+      <p:sp>
+        <p:nvSpPr>
+          <p:cNvPr id="4" name="Datumsplatzhalter 3">
+            <a:extLst>
+              <a:ext uri="{FF2B5EF4-FFF2-40B4-BE49-F238E27FC236}">
+                <a16:creationId xmlns:a16="http://schemas.microsoft.com/office/drawing/2014/main" id="{AA2DFAA3-D144-50A0-9C58-AB2639736D8E}"/>
+              </a:ext>
+            </a:extLst>
+          </p:cNvPr>
+          <p:cNvSpPr>
+            <a:spLocks noGrp="1"/>
+          </p:cNvSpPr>
+          <p:nvPr>
+            <p:ph type="dt" sz="half" idx="10"/>
+          </p:nvPr>
+        </p:nvSpPr>
+        <p:spPr/>
+        <p:txBody>
+          <a:bodyPr/>
+          <a:lstStyle/>
+          <a:p>
+            <a:r>
+              <a:rPr lang="de-DE"/>
+              <a:t>05.12.2023</a:t>
+            </a:r>
+            <a:endParaRPr lang="de-DE" dirty="0"/>
+          </a:p>
+        </p:txBody>
+      </p:sp>
+      <p:sp>
+        <p:nvSpPr>
+          <p:cNvPr id="5" name="Fußzeilenplatzhalter 4">
+            <a:extLst>
+              <a:ext uri="{FF2B5EF4-FFF2-40B4-BE49-F238E27FC236}">
+                <a16:creationId xmlns:a16="http://schemas.microsoft.com/office/drawing/2014/main" id="{02D8580E-0F61-BDDB-77CC-E4F419C5A7D2}"/>
+              </a:ext>
+            </a:extLst>
+          </p:cNvPr>
+          <p:cNvSpPr>
+            <a:spLocks noGrp="1"/>
+          </p:cNvSpPr>
+          <p:nvPr>
+            <p:ph type="ftr" sz="quarter" idx="11"/>
+          </p:nvPr>
+        </p:nvSpPr>
+        <p:spPr/>
+        <p:txBody>
+          <a:bodyPr/>
+          <a:lstStyle/>
+          <a:p>
+            <a:r>
+              <a:rPr lang="en-US"/>
+              <a:t>Multi-modal Speech Representation Learning</a:t>
+            </a:r>
+            <a:endParaRPr lang="de-DE" dirty="0"/>
+          </a:p>
+        </p:txBody>
+      </p:sp>
+      <p:sp>
+        <p:nvSpPr>
+          <p:cNvPr id="6" name="Foliennummernplatzhalter 5">
+            <a:extLst>
+              <a:ext uri="{FF2B5EF4-FFF2-40B4-BE49-F238E27FC236}">
+                <a16:creationId xmlns:a16="http://schemas.microsoft.com/office/drawing/2014/main" id="{5F851B5D-42CC-F4ED-FF52-3115D318058A}"/>
+              </a:ext>
+            </a:extLst>
+          </p:cNvPr>
+          <p:cNvSpPr>
+            <a:spLocks noGrp="1"/>
+          </p:cNvSpPr>
+          <p:nvPr>
+            <p:ph type="sldNum" sz="quarter" idx="12"/>
+          </p:nvPr>
+        </p:nvSpPr>
+        <p:spPr/>
+        <p:txBody>
+          <a:bodyPr/>
+          <a:lstStyle/>
+          <a:p>
+            <a:fld id="{4589C08E-11F1-4614-AD94-2F79D605AB8D}" type="slidenum">
+              <a:rPr lang="de-DE" smtClean="0"/>
+              <a:t>15</a:t>
+            </a:fld>
+            <a:endParaRPr lang="de-DE" dirty="0"/>
+          </a:p>
+        </p:txBody>
+      </p:sp>
+    </p:spTree>
+    <p:extLst>
+      <p:ext uri="{BB962C8B-B14F-4D97-AF65-F5344CB8AC3E}">
+        <p14:creationId xmlns:p14="http://schemas.microsoft.com/office/powerpoint/2010/main" val="87589397"/>
+      </p:ext>
+    </p:extLst>
+  </p:cSld>
+  <p:clrMapOvr>
+    <a:masterClrMapping/>
+  </p:clrMapOvr>
+</p:sld>
+</file>
+
+<file path=ppt/slides/slide16.xml><?xml version="1.0" encoding="utf-8"?>
+<p:sld xmlns:a="http://schemas.openxmlformats.org/drawingml/2006/main" xmlns:r="http://schemas.openxmlformats.org/officeDocument/2006/relationships" xmlns:p="http://schemas.openxmlformats.org/presentationml/2006/main">
+  <p:cSld>
+    <p:spTree>
+      <p:nvGrpSpPr>
+        <p:cNvPr id="1" name=""/>
+        <p:cNvGrpSpPr/>
+        <p:nvPr/>
+      </p:nvGrpSpPr>
+      <p:grpSpPr>
+        <a:xfrm>
+          <a:off x="0" y="0"/>
+          <a:ext cx="0" cy="0"/>
+          <a:chOff x="0" y="0"/>
+          <a:chExt cx="0" cy="0"/>
+        </a:xfrm>
+      </p:grpSpPr>
+      <p:sp>
+        <p:nvSpPr>
+          <p:cNvPr id="2" name="Titel 1">
+            <a:extLst>
+              <a:ext uri="{FF2B5EF4-FFF2-40B4-BE49-F238E27FC236}">
+                <a16:creationId xmlns:a16="http://schemas.microsoft.com/office/drawing/2014/main" id="{358629DF-DE7D-BAA9-F837-194F89F9BC96}"/>
+              </a:ext>
+            </a:extLst>
+          </p:cNvPr>
+          <p:cNvSpPr>
+            <a:spLocks noGrp="1"/>
+          </p:cNvSpPr>
+          <p:nvPr>
+            <p:ph type="title"/>
+          </p:nvPr>
+        </p:nvSpPr>
+        <p:spPr/>
+        <p:txBody>
+          <a:bodyPr/>
+          <a:lstStyle/>
+          <a:p>
+            <a:r>
+              <a:rPr lang="de-DE" dirty="0"/>
+              <a:t>Visual-Audio-Text LM (2023/05)</a:t>
+            </a:r>
+          </a:p>
+        </p:txBody>
+      </p:sp>
+      <p:sp>
+        <p:nvSpPr>
+          <p:cNvPr id="3" name="Inhaltsplatzhalter 2">
+            <a:extLst>
+              <a:ext uri="{FF2B5EF4-FFF2-40B4-BE49-F238E27FC236}">
+                <a16:creationId xmlns:a16="http://schemas.microsoft.com/office/drawing/2014/main" id="{C122DCDD-7E10-B6E4-9A57-42E9DB86B263}"/>
+              </a:ext>
+            </a:extLst>
+          </p:cNvPr>
+          <p:cNvSpPr>
+            <a:spLocks noGrp="1"/>
+          </p:cNvSpPr>
+          <p:nvPr>
+            <p:ph idx="1"/>
+          </p:nvPr>
+        </p:nvSpPr>
+        <p:spPr/>
+        <p:txBody>
+          <a:bodyPr/>
+          <a:lstStyle/>
+          <a:p>
+            <a:r>
+              <a:rPr lang="de-DE" dirty="0" err="1"/>
+              <a:t>Results</a:t>
+            </a:r>
+            <a:r>
+              <a:rPr lang="de-DE" dirty="0"/>
+              <a:t> / </a:t>
+            </a:r>
+            <a:r>
+              <a:rPr lang="de-DE" dirty="0" err="1"/>
+              <a:t>compare</a:t>
+            </a:r>
+            <a:r>
+              <a:rPr lang="de-DE" dirty="0"/>
+              <a:t> </a:t>
+            </a:r>
+            <a:r>
+              <a:rPr lang="de-DE" dirty="0" err="1"/>
+              <a:t>to</a:t>
+            </a:r>
+            <a:r>
+              <a:rPr lang="de-DE" dirty="0"/>
+              <a:t> SpeechT5 and AV-</a:t>
+            </a:r>
+            <a:r>
+              <a:rPr lang="de-DE" dirty="0" err="1"/>
+              <a:t>HuBERT</a:t>
+            </a:r>
+            <a:endParaRPr lang="de-DE" dirty="0"/>
+          </a:p>
+        </p:txBody>
+      </p:sp>
+      <p:sp>
+        <p:nvSpPr>
+          <p:cNvPr id="4" name="Datumsplatzhalter 3">
+            <a:extLst>
+              <a:ext uri="{FF2B5EF4-FFF2-40B4-BE49-F238E27FC236}">
+                <a16:creationId xmlns:a16="http://schemas.microsoft.com/office/drawing/2014/main" id="{AA2DFAA3-D144-50A0-9C58-AB2639736D8E}"/>
+              </a:ext>
+            </a:extLst>
+          </p:cNvPr>
+          <p:cNvSpPr>
+            <a:spLocks noGrp="1"/>
+          </p:cNvSpPr>
+          <p:nvPr>
+            <p:ph type="dt" sz="half" idx="10"/>
+          </p:nvPr>
+        </p:nvSpPr>
+        <p:spPr/>
+        <p:txBody>
+          <a:bodyPr/>
+          <a:lstStyle/>
+          <a:p>
+            <a:r>
+              <a:rPr lang="de-DE"/>
+              <a:t>05.12.2023</a:t>
+            </a:r>
+            <a:endParaRPr lang="de-DE" dirty="0"/>
+          </a:p>
+        </p:txBody>
+      </p:sp>
+      <p:sp>
+        <p:nvSpPr>
+          <p:cNvPr id="5" name="Fußzeilenplatzhalter 4">
+            <a:extLst>
+              <a:ext uri="{FF2B5EF4-FFF2-40B4-BE49-F238E27FC236}">
+                <a16:creationId xmlns:a16="http://schemas.microsoft.com/office/drawing/2014/main" id="{02D8580E-0F61-BDDB-77CC-E4F419C5A7D2}"/>
+              </a:ext>
+            </a:extLst>
+          </p:cNvPr>
+          <p:cNvSpPr>
+            <a:spLocks noGrp="1"/>
+          </p:cNvSpPr>
+          <p:nvPr>
+            <p:ph type="ftr" sz="quarter" idx="11"/>
+          </p:nvPr>
+        </p:nvSpPr>
+        <p:spPr/>
+        <p:txBody>
+          <a:bodyPr/>
+          <a:lstStyle/>
+          <a:p>
+            <a:r>
+              <a:rPr lang="en-US"/>
+              <a:t>Multi-modal Speech Representation Learning</a:t>
+            </a:r>
+            <a:endParaRPr lang="de-DE" dirty="0"/>
+          </a:p>
+        </p:txBody>
+      </p:sp>
+      <p:sp>
+        <p:nvSpPr>
+          <p:cNvPr id="6" name="Foliennummernplatzhalter 5">
+            <a:extLst>
+              <a:ext uri="{FF2B5EF4-FFF2-40B4-BE49-F238E27FC236}">
+                <a16:creationId xmlns:a16="http://schemas.microsoft.com/office/drawing/2014/main" id="{5F851B5D-42CC-F4ED-FF52-3115D318058A}"/>
+              </a:ext>
+            </a:extLst>
+          </p:cNvPr>
+          <p:cNvSpPr>
+            <a:spLocks noGrp="1"/>
+          </p:cNvSpPr>
+          <p:nvPr>
+            <p:ph type="sldNum" sz="quarter" idx="12"/>
+          </p:nvPr>
+        </p:nvSpPr>
+        <p:spPr/>
+        <p:txBody>
+          <a:bodyPr/>
+          <a:lstStyle/>
+          <a:p>
+            <a:fld id="{4589C08E-11F1-4614-AD94-2F79D605AB8D}" type="slidenum">
+              <a:rPr lang="de-DE" smtClean="0"/>
+              <a:t>16</a:t>
+            </a:fld>
+            <a:endParaRPr lang="de-DE" dirty="0"/>
+          </a:p>
+        </p:txBody>
+      </p:sp>
+    </p:spTree>
+    <p:extLst>
+      <p:ext uri="{BB962C8B-B14F-4D97-AF65-F5344CB8AC3E}">
+        <p14:creationId xmlns:p14="http://schemas.microsoft.com/office/powerpoint/2010/main" val="1781512618"/>
+      </p:ext>
+    </p:extLst>
+  </p:cSld>
+  <p:clrMapOvr>
+    <a:masterClrMapping/>
+  </p:clrMapOvr>
+</p:sld>
+</file>
+
+<file path=ppt/slides/slide17.xml><?xml version="1.0" encoding="utf-8"?>
+<p:sld xmlns:a="http://schemas.openxmlformats.org/drawingml/2006/main" xmlns:r="http://schemas.openxmlformats.org/officeDocument/2006/relationships" xmlns:p="http://schemas.openxmlformats.org/presentationml/2006/main">
+  <p:cSld>
+    <p:spTree>
+      <p:nvGrpSpPr>
+        <p:cNvPr id="1" name=""/>
+        <p:cNvGrpSpPr/>
+        <p:nvPr/>
+      </p:nvGrpSpPr>
+      <p:grpSpPr>
+        <a:xfrm>
+          <a:off x="0" y="0"/>
+          <a:ext cx="0" cy="0"/>
+          <a:chOff x="0" y="0"/>
+          <a:chExt cx="0" cy="0"/>
+        </a:xfrm>
+      </p:grpSpPr>
+      <p:sp>
+        <p:nvSpPr>
+          <p:cNvPr id="2" name="Titel 1">
+            <a:extLst>
+              <a:ext uri="{FF2B5EF4-FFF2-40B4-BE49-F238E27FC236}">
+                <a16:creationId xmlns:a16="http://schemas.microsoft.com/office/drawing/2014/main" id="{358629DF-DE7D-BAA9-F837-194F89F9BC96}"/>
+              </a:ext>
+            </a:extLst>
+          </p:cNvPr>
+          <p:cNvSpPr>
+            <a:spLocks noGrp="1"/>
+          </p:cNvSpPr>
+          <p:nvPr>
+            <p:ph type="title"/>
+          </p:nvPr>
+        </p:nvSpPr>
+        <p:spPr/>
+        <p:txBody>
+          <a:bodyPr/>
+          <a:lstStyle/>
+          <a:p>
+            <a:r>
+              <a:rPr lang="de-DE" dirty="0"/>
+              <a:t>Adv./</a:t>
+            </a:r>
+            <a:r>
+              <a:rPr lang="de-DE" dirty="0" err="1"/>
+              <a:t>Drawbacks</a:t>
+            </a:r>
+            <a:r>
+              <a:rPr lang="de-DE" dirty="0"/>
+              <a:t> of Multimodal Learning</a:t>
+            </a:r>
+          </a:p>
+        </p:txBody>
+      </p:sp>
+      <p:sp>
+        <p:nvSpPr>
+          <p:cNvPr id="3" name="Inhaltsplatzhalter 2">
+            <a:extLst>
+              <a:ext uri="{FF2B5EF4-FFF2-40B4-BE49-F238E27FC236}">
+                <a16:creationId xmlns:a16="http://schemas.microsoft.com/office/drawing/2014/main" id="{C122DCDD-7E10-B6E4-9A57-42E9DB86B263}"/>
+              </a:ext>
+            </a:extLst>
+          </p:cNvPr>
+          <p:cNvSpPr>
+            <a:spLocks noGrp="1"/>
+          </p:cNvSpPr>
+          <p:nvPr>
+            <p:ph idx="1"/>
+          </p:nvPr>
+        </p:nvSpPr>
+        <p:spPr/>
+        <p:txBody>
+          <a:bodyPr/>
+          <a:lstStyle/>
+          <a:p>
+            <a:r>
+              <a:rPr lang="de-DE" dirty="0"/>
+              <a:t>Domain-</a:t>
+            </a:r>
+            <a:r>
+              <a:rPr lang="de-DE" dirty="0" err="1"/>
+              <a:t>specific</a:t>
+            </a:r>
+            <a:r>
+              <a:rPr lang="de-DE" dirty="0"/>
+              <a:t> </a:t>
+            </a:r>
+            <a:r>
+              <a:rPr lang="de-DE" dirty="0" err="1"/>
+              <a:t>data</a:t>
+            </a:r>
+            <a:r>
+              <a:rPr lang="de-DE" dirty="0"/>
+              <a:t> </a:t>
+            </a:r>
+            <a:r>
+              <a:rPr lang="de-DE" dirty="0">
+                <a:sym typeface="Wingdings" panose="05000000000000000000" pitchFamily="2" charset="2"/>
+              </a:rPr>
+              <a:t> </a:t>
+            </a:r>
+            <a:r>
+              <a:rPr lang="de-DE" dirty="0" err="1">
+                <a:sym typeface="Wingdings" panose="05000000000000000000" pitchFamily="2" charset="2"/>
+              </a:rPr>
+              <a:t>no</a:t>
+            </a:r>
+            <a:r>
+              <a:rPr lang="de-DE" dirty="0">
+                <a:sym typeface="Wingdings" panose="05000000000000000000" pitchFamily="2" charset="2"/>
+              </a:rPr>
+              <a:t> </a:t>
+            </a:r>
+            <a:r>
+              <a:rPr lang="de-DE" dirty="0" err="1">
+                <a:sym typeface="Wingdings" panose="05000000000000000000" pitchFamily="2" charset="2"/>
+              </a:rPr>
+              <a:t>no</a:t>
+            </a:r>
+            <a:endParaRPr lang="de-DE" dirty="0"/>
+          </a:p>
+        </p:txBody>
+      </p:sp>
+      <p:sp>
+        <p:nvSpPr>
+          <p:cNvPr id="4" name="Datumsplatzhalter 3">
+            <a:extLst>
+              <a:ext uri="{FF2B5EF4-FFF2-40B4-BE49-F238E27FC236}">
+                <a16:creationId xmlns:a16="http://schemas.microsoft.com/office/drawing/2014/main" id="{AA2DFAA3-D144-50A0-9C58-AB2639736D8E}"/>
+              </a:ext>
+            </a:extLst>
+          </p:cNvPr>
+          <p:cNvSpPr>
+            <a:spLocks noGrp="1"/>
+          </p:cNvSpPr>
+          <p:nvPr>
+            <p:ph type="dt" sz="half" idx="10"/>
+          </p:nvPr>
+        </p:nvSpPr>
+        <p:spPr/>
+        <p:txBody>
+          <a:bodyPr/>
+          <a:lstStyle/>
+          <a:p>
+            <a:r>
+              <a:rPr lang="de-DE"/>
+              <a:t>05.12.2023</a:t>
+            </a:r>
+            <a:endParaRPr lang="de-DE" dirty="0"/>
+          </a:p>
+        </p:txBody>
+      </p:sp>
+      <p:sp>
+        <p:nvSpPr>
+          <p:cNvPr id="5" name="Fußzeilenplatzhalter 4">
+            <a:extLst>
+              <a:ext uri="{FF2B5EF4-FFF2-40B4-BE49-F238E27FC236}">
+                <a16:creationId xmlns:a16="http://schemas.microsoft.com/office/drawing/2014/main" id="{02D8580E-0F61-BDDB-77CC-E4F419C5A7D2}"/>
+              </a:ext>
+            </a:extLst>
+          </p:cNvPr>
+          <p:cNvSpPr>
+            <a:spLocks noGrp="1"/>
+          </p:cNvSpPr>
+          <p:nvPr>
+            <p:ph type="ftr" sz="quarter" idx="11"/>
+          </p:nvPr>
+        </p:nvSpPr>
+        <p:spPr/>
+        <p:txBody>
+          <a:bodyPr/>
+          <a:lstStyle/>
+          <a:p>
+            <a:r>
+              <a:rPr lang="en-US"/>
+              <a:t>Multi-modal Speech Representation Learning</a:t>
+            </a:r>
+            <a:endParaRPr lang="de-DE" dirty="0"/>
+          </a:p>
+        </p:txBody>
+      </p:sp>
+      <p:sp>
+        <p:nvSpPr>
+          <p:cNvPr id="6" name="Foliennummernplatzhalter 5">
+            <a:extLst>
+              <a:ext uri="{FF2B5EF4-FFF2-40B4-BE49-F238E27FC236}">
+                <a16:creationId xmlns:a16="http://schemas.microsoft.com/office/drawing/2014/main" id="{5F851B5D-42CC-F4ED-FF52-3115D318058A}"/>
+              </a:ext>
+            </a:extLst>
+          </p:cNvPr>
+          <p:cNvSpPr>
+            <a:spLocks noGrp="1"/>
+          </p:cNvSpPr>
+          <p:nvPr>
+            <p:ph type="sldNum" sz="quarter" idx="12"/>
+          </p:nvPr>
+        </p:nvSpPr>
+        <p:spPr/>
+        <p:txBody>
+          <a:bodyPr/>
+          <a:lstStyle/>
+          <a:p>
+            <a:fld id="{4589C08E-11F1-4614-AD94-2F79D605AB8D}" type="slidenum">
+              <a:rPr lang="de-DE" smtClean="0"/>
+              <a:t>17</a:t>
+            </a:fld>
+            <a:endParaRPr lang="de-DE" dirty="0"/>
+          </a:p>
+        </p:txBody>
+      </p:sp>
+    </p:spTree>
+    <p:extLst>
+      <p:ext uri="{BB962C8B-B14F-4D97-AF65-F5344CB8AC3E}">
+        <p14:creationId xmlns:p14="http://schemas.microsoft.com/office/powerpoint/2010/main" val="92422634"/>
+      </p:ext>
+    </p:extLst>
+  </p:cSld>
+  <p:clrMapOvr>
+    <a:masterClrMapping/>
+  </p:clrMapOvr>
+</p:sld>
+</file>
+
+<file path=ppt/slides/slide18.xml><?xml version="1.0" encoding="utf-8"?>
+<p:sld xmlns:a="http://schemas.openxmlformats.org/drawingml/2006/main" xmlns:r="http://schemas.openxmlformats.org/officeDocument/2006/relationships" xmlns:p="http://schemas.openxmlformats.org/presentationml/2006/main">
+  <p:cSld>
+    <p:spTree>
+      <p:nvGrpSpPr>
+        <p:cNvPr id="1" name=""/>
+        <p:cNvGrpSpPr/>
+        <p:nvPr/>
+      </p:nvGrpSpPr>
+      <p:grpSpPr>
+        <a:xfrm>
+          <a:off x="0" y="0"/>
+          <a:ext cx="0" cy="0"/>
+          <a:chOff x="0" y="0"/>
+          <a:chExt cx="0" cy="0"/>
+        </a:xfrm>
+      </p:grpSpPr>
+      <p:sp>
+        <p:nvSpPr>
+          <p:cNvPr id="2" name="Titel 1">
+            <a:extLst>
+              <a:ext uri="{FF2B5EF4-FFF2-40B4-BE49-F238E27FC236}">
+                <a16:creationId xmlns:a16="http://schemas.microsoft.com/office/drawing/2014/main" id="{A5AA884D-9FF9-ADE1-DD18-42738AA778F6}"/>
+              </a:ext>
+            </a:extLst>
+          </p:cNvPr>
+          <p:cNvSpPr>
+            <a:spLocks noGrp="1"/>
+          </p:cNvSpPr>
+          <p:nvPr>
+            <p:ph type="title"/>
+          </p:nvPr>
+        </p:nvSpPr>
+        <p:spPr/>
+        <p:txBody>
+          <a:bodyPr/>
+          <a:lstStyle/>
+          <a:p>
+            <a:r>
+              <a:rPr lang="de-DE" dirty="0"/>
+              <a:t>Challenges / </a:t>
+            </a:r>
+            <a:r>
+              <a:rPr lang="de-DE" dirty="0" err="1"/>
+              <a:t>Prospects</a:t>
+            </a:r>
+            <a:endParaRPr lang="de-DE" dirty="0"/>
+          </a:p>
+        </p:txBody>
+      </p:sp>
+      <p:sp>
+        <p:nvSpPr>
+          <p:cNvPr id="3" name="Inhaltsplatzhalter 2">
+            <a:extLst>
+              <a:ext uri="{FF2B5EF4-FFF2-40B4-BE49-F238E27FC236}">
+                <a16:creationId xmlns:a16="http://schemas.microsoft.com/office/drawing/2014/main" id="{3B2AF2DA-0C13-2231-5223-79DCFDDF93CD}"/>
+              </a:ext>
+            </a:extLst>
+          </p:cNvPr>
+          <p:cNvSpPr>
+            <a:spLocks noGrp="1"/>
+          </p:cNvSpPr>
+          <p:nvPr>
+            <p:ph idx="1"/>
+          </p:nvPr>
+        </p:nvSpPr>
+        <p:spPr/>
+        <p:txBody>
+          <a:bodyPr/>
+          <a:lstStyle/>
+          <a:p>
+            <a:r>
+              <a:rPr lang="de-DE" dirty="0"/>
+              <a:t>(Multi-modal) Speech </a:t>
+            </a:r>
+            <a:r>
+              <a:rPr lang="de-DE" dirty="0" err="1"/>
+              <a:t>Representation</a:t>
+            </a:r>
+            <a:r>
+              <a:rPr lang="de-DE" dirty="0"/>
+              <a:t> Learning </a:t>
+            </a:r>
+            <a:r>
+              <a:rPr lang="de-DE" dirty="0" err="1"/>
+              <a:t>is</a:t>
+            </a:r>
+            <a:r>
+              <a:rPr lang="de-DE" dirty="0"/>
+              <a:t> </a:t>
+            </a:r>
+            <a:r>
+              <a:rPr lang="de-DE" dirty="0" err="1"/>
+              <a:t>heavily</a:t>
+            </a:r>
+            <a:r>
+              <a:rPr lang="de-DE" dirty="0"/>
+              <a:t> </a:t>
+            </a:r>
+            <a:r>
+              <a:rPr lang="de-DE" dirty="0" err="1"/>
+              <a:t>researched</a:t>
+            </a:r>
+            <a:r>
+              <a:rPr lang="de-DE" dirty="0"/>
+              <a:t> </a:t>
+            </a:r>
+            <a:r>
+              <a:rPr lang="de-DE" dirty="0" err="1"/>
+              <a:t>field</a:t>
+            </a:r>
+            <a:endParaRPr lang="de-DE" dirty="0"/>
+          </a:p>
+          <a:p>
+            <a:endParaRPr lang="de-DE" dirty="0"/>
+          </a:p>
+        </p:txBody>
+      </p:sp>
+      <p:sp>
+        <p:nvSpPr>
+          <p:cNvPr id="4" name="Datumsplatzhalter 3">
+            <a:extLst>
+              <a:ext uri="{FF2B5EF4-FFF2-40B4-BE49-F238E27FC236}">
+                <a16:creationId xmlns:a16="http://schemas.microsoft.com/office/drawing/2014/main" id="{D634373F-6B03-7938-9148-0CE7A4B01FEB}"/>
+              </a:ext>
+            </a:extLst>
+          </p:cNvPr>
+          <p:cNvSpPr>
+            <a:spLocks noGrp="1"/>
+          </p:cNvSpPr>
+          <p:nvPr>
+            <p:ph type="dt" sz="half" idx="10"/>
+          </p:nvPr>
+        </p:nvSpPr>
+        <p:spPr/>
+        <p:txBody>
+          <a:bodyPr/>
+          <a:lstStyle/>
+          <a:p>
+            <a:r>
+              <a:rPr lang="de-DE"/>
+              <a:t>05.12.2023</a:t>
+            </a:r>
+            <a:endParaRPr lang="de-DE" dirty="0"/>
+          </a:p>
+        </p:txBody>
+      </p:sp>
+      <p:sp>
+        <p:nvSpPr>
+          <p:cNvPr id="5" name="Fußzeilenplatzhalter 4">
+            <a:extLst>
+              <a:ext uri="{FF2B5EF4-FFF2-40B4-BE49-F238E27FC236}">
+                <a16:creationId xmlns:a16="http://schemas.microsoft.com/office/drawing/2014/main" id="{034C8994-9B21-3CAF-B2C8-F4005BBEF94E}"/>
+              </a:ext>
+            </a:extLst>
+          </p:cNvPr>
+          <p:cNvSpPr>
+            <a:spLocks noGrp="1"/>
+          </p:cNvSpPr>
+          <p:nvPr>
+            <p:ph type="ftr" sz="quarter" idx="11"/>
+          </p:nvPr>
+        </p:nvSpPr>
+        <p:spPr/>
+        <p:txBody>
+          <a:bodyPr/>
+          <a:lstStyle/>
+          <a:p>
+            <a:r>
+              <a:rPr lang="en-US"/>
+              <a:t>Multi-modal Speech Representation Learning</a:t>
+            </a:r>
+            <a:endParaRPr lang="de-DE" dirty="0"/>
+          </a:p>
+        </p:txBody>
+      </p:sp>
+      <p:sp>
+        <p:nvSpPr>
+          <p:cNvPr id="6" name="Foliennummernplatzhalter 5">
+            <a:extLst>
+              <a:ext uri="{FF2B5EF4-FFF2-40B4-BE49-F238E27FC236}">
+                <a16:creationId xmlns:a16="http://schemas.microsoft.com/office/drawing/2014/main" id="{AED1C7AE-4D69-C023-148D-6CE0CF086ED4}"/>
+              </a:ext>
+            </a:extLst>
+          </p:cNvPr>
+          <p:cNvSpPr>
+            <a:spLocks noGrp="1"/>
+          </p:cNvSpPr>
+          <p:nvPr>
+            <p:ph type="sldNum" sz="quarter" idx="12"/>
+          </p:nvPr>
+        </p:nvSpPr>
+        <p:spPr/>
+        <p:txBody>
+          <a:bodyPr/>
+          <a:lstStyle/>
+          <a:p>
+            <a:fld id="{4589C08E-11F1-4614-AD94-2F79D605AB8D}" type="slidenum">
+              <a:rPr lang="de-DE" smtClean="0"/>
+              <a:t>18</a:t>
+            </a:fld>
+            <a:endParaRPr lang="de-DE" dirty="0"/>
+          </a:p>
+        </p:txBody>
+      </p:sp>
+    </p:spTree>
+    <p:extLst>
+      <p:ext uri="{BB962C8B-B14F-4D97-AF65-F5344CB8AC3E}">
+        <p14:creationId xmlns:p14="http://schemas.microsoft.com/office/powerpoint/2010/main" val="3187350724"/>
+      </p:ext>
+    </p:extLst>
+  </p:cSld>
+  <p:clrMapOvr>
+    <a:masterClrMapping/>
+  </p:clrMapOvr>
+</p:sld>
+</file>
+
+<file path=ppt/slides/slide19.xml><?xml version="1.0" encoding="utf-8"?>
+<p:sld xmlns:a="http://schemas.openxmlformats.org/drawingml/2006/main" xmlns:r="http://schemas.openxmlformats.org/officeDocument/2006/relationships" xmlns:p="http://schemas.openxmlformats.org/presentationml/2006/main">
+  <p:cSld>
+    <p:spTree>
+      <p:nvGrpSpPr>
+        <p:cNvPr id="1" name=""/>
+        <p:cNvGrpSpPr/>
+        <p:nvPr/>
+      </p:nvGrpSpPr>
+      <p:grpSpPr>
+        <a:xfrm>
+          <a:off x="0" y="0"/>
+          <a:ext cx="0" cy="0"/>
+          <a:chOff x="0" y="0"/>
+          <a:chExt cx="0" cy="0"/>
+        </a:xfrm>
+      </p:grpSpPr>
+      <p:sp>
+        <p:nvSpPr>
+          <p:cNvPr id="3" name="Inhaltsplatzhalter 2">
+            <a:extLst>
+              <a:ext uri="{FF2B5EF4-FFF2-40B4-BE49-F238E27FC236}">
+                <a16:creationId xmlns:a16="http://schemas.microsoft.com/office/drawing/2014/main" id="{DA58E8C4-24E6-5730-F68A-FA8C6C5C5E5E}"/>
+              </a:ext>
+            </a:extLst>
+          </p:cNvPr>
+          <p:cNvSpPr>
+            <a:spLocks noGrp="1"/>
+          </p:cNvSpPr>
+          <p:nvPr>
+            <p:ph idx="1"/>
+          </p:nvPr>
+        </p:nvSpPr>
+        <p:spPr>
+          <a:xfrm>
+            <a:off x="838200" y="589547"/>
+            <a:ext cx="10515600" cy="5587416"/>
+          </a:xfrm>
+        </p:spPr>
+        <p:txBody>
+          <a:bodyPr/>
+          <a:lstStyle/>
+          <a:p>
+            <a:pPr marL="0" indent="0">
+              <a:buNone/>
+            </a:pPr>
+            <a:r>
+              <a:rPr lang="en-US" sz="2800" dirty="0">
+                <a:solidFill>
+                  <a:schemeClr val="bg2">
+                    <a:lumMod val="50000"/>
+                  </a:schemeClr>
+                </a:solidFill>
+                <a:effectLst/>
+              </a:rPr>
+              <a:t>Sources</a:t>
+            </a:r>
+          </a:p>
+          <a:p>
+            <a:pPr marL="0" indent="0">
+              <a:buNone/>
+            </a:pPr>
+            <a:r>
+              <a:rPr lang="en-US" sz="2800" dirty="0">
+                <a:solidFill>
+                  <a:schemeClr val="bg2">
+                    <a:lumMod val="50000"/>
+                  </a:schemeClr>
+                </a:solidFill>
+                <a:effectLst/>
+              </a:rPr>
+              <a:t>[1] Mohamed, Abdelrahman, et al. "Self-supervised speech representation learning: A review." IEEE Journal of Selected Topics in Signal Processing (2022).</a:t>
+            </a:r>
+          </a:p>
+          <a:p>
+            <a:pPr marL="0" indent="0">
+              <a:buNone/>
+            </a:pPr>
+            <a:r>
+              <a:rPr lang="en-US" sz="2800" dirty="0">
+                <a:solidFill>
+                  <a:schemeClr val="bg2">
+                    <a:lumMod val="50000"/>
+                  </a:schemeClr>
+                </a:solidFill>
+                <a:effectLst/>
+              </a:rPr>
+              <a:t>[2] Ao, </a:t>
+            </a:r>
+            <a:r>
+              <a:rPr lang="en-US" sz="2800" dirty="0" err="1">
+                <a:solidFill>
+                  <a:schemeClr val="bg2">
+                    <a:lumMod val="50000"/>
+                  </a:schemeClr>
+                </a:solidFill>
+                <a:effectLst/>
+              </a:rPr>
+              <a:t>Junyi</a:t>
+            </a:r>
+            <a:r>
+              <a:rPr lang="en-US" sz="2800" dirty="0">
+                <a:solidFill>
+                  <a:schemeClr val="bg2">
+                    <a:lumMod val="50000"/>
+                  </a:schemeClr>
+                </a:solidFill>
+                <a:effectLst/>
+              </a:rPr>
+              <a:t>, et al. "Speecht5: Unified-modal encoder-decoder pre-training for spoken language processing." ACL (2022).</a:t>
+            </a:r>
+          </a:p>
+          <a:p>
+            <a:pPr marL="0" indent="0">
+              <a:buNone/>
+            </a:pPr>
+            <a:r>
+              <a:rPr lang="en-US" sz="2800" dirty="0">
+                <a:solidFill>
+                  <a:schemeClr val="bg2">
+                    <a:lumMod val="50000"/>
+                  </a:schemeClr>
+                </a:solidFill>
+                <a:effectLst/>
+              </a:rPr>
+              <a:t>[3] Zhu, </a:t>
+            </a:r>
+            <a:r>
+              <a:rPr lang="en-US" sz="2800" dirty="0" err="1">
+                <a:solidFill>
+                  <a:schemeClr val="bg2">
+                    <a:lumMod val="50000"/>
+                  </a:schemeClr>
+                </a:solidFill>
+                <a:effectLst/>
+              </a:rPr>
+              <a:t>Qiushi</a:t>
+            </a:r>
+            <a:r>
+              <a:rPr lang="en-US" sz="2800" dirty="0">
+                <a:solidFill>
+                  <a:schemeClr val="bg2">
+                    <a:lumMod val="50000"/>
+                  </a:schemeClr>
+                </a:solidFill>
+                <a:effectLst/>
+              </a:rPr>
+              <a:t>, et al. "</a:t>
+            </a:r>
+            <a:r>
+              <a:rPr lang="en-US" sz="2800" dirty="0" err="1">
+                <a:solidFill>
+                  <a:schemeClr val="bg2">
+                    <a:lumMod val="50000"/>
+                  </a:schemeClr>
+                </a:solidFill>
+                <a:effectLst/>
+              </a:rPr>
+              <a:t>Vatlm</a:t>
+            </a:r>
+            <a:r>
+              <a:rPr lang="en-US" sz="2800" dirty="0">
+                <a:solidFill>
+                  <a:schemeClr val="bg2">
+                    <a:lumMod val="50000"/>
+                  </a:schemeClr>
+                </a:solidFill>
+                <a:effectLst/>
+              </a:rPr>
+              <a:t>: Visual-audio-text pre-training with unified masked prediction for speech representation learning." IEEE Transactions on Multimedia (2023).</a:t>
+            </a:r>
+          </a:p>
+          <a:p>
+            <a:pPr marL="0" indent="0">
+              <a:buNone/>
+            </a:pPr>
+            <a:r>
+              <a:rPr lang="en-US" sz="2800" dirty="0">
+                <a:solidFill>
+                  <a:schemeClr val="bg2">
+                    <a:lumMod val="50000"/>
+                  </a:schemeClr>
+                </a:solidFill>
+                <a:effectLst/>
+              </a:rPr>
+              <a:t>[4] Shi, Bowen, et al. "Learning audio-visual speech representation by masked multimodal cluster prediction." ICLR (2022).</a:t>
+            </a:r>
+          </a:p>
+          <a:p>
+            <a:endParaRPr lang="de-DE" dirty="0"/>
+          </a:p>
+        </p:txBody>
+      </p:sp>
+      <p:sp>
+        <p:nvSpPr>
+          <p:cNvPr id="4" name="Datumsplatzhalter 3">
+            <a:extLst>
+              <a:ext uri="{FF2B5EF4-FFF2-40B4-BE49-F238E27FC236}">
+                <a16:creationId xmlns:a16="http://schemas.microsoft.com/office/drawing/2014/main" id="{FDB16A7C-3447-5A3F-AA02-DBF9A1E8C433}"/>
+              </a:ext>
+            </a:extLst>
+          </p:cNvPr>
+          <p:cNvSpPr>
+            <a:spLocks noGrp="1"/>
+          </p:cNvSpPr>
+          <p:nvPr>
+            <p:ph type="dt" sz="half" idx="10"/>
+          </p:nvPr>
+        </p:nvSpPr>
+        <p:spPr/>
+        <p:txBody>
+          <a:bodyPr/>
+          <a:lstStyle/>
+          <a:p>
+            <a:r>
+              <a:rPr lang="de-DE"/>
+              <a:t>05.12.2023</a:t>
+            </a:r>
+            <a:endParaRPr lang="de-DE" dirty="0"/>
+          </a:p>
+        </p:txBody>
+      </p:sp>
+      <p:sp>
+        <p:nvSpPr>
+          <p:cNvPr id="5" name="Fußzeilenplatzhalter 4">
+            <a:extLst>
+              <a:ext uri="{FF2B5EF4-FFF2-40B4-BE49-F238E27FC236}">
+                <a16:creationId xmlns:a16="http://schemas.microsoft.com/office/drawing/2014/main" id="{1BFF79C0-74D4-F6A9-2568-FE07B3251238}"/>
+              </a:ext>
+            </a:extLst>
+          </p:cNvPr>
+          <p:cNvSpPr>
+            <a:spLocks noGrp="1"/>
+          </p:cNvSpPr>
+          <p:nvPr>
+            <p:ph type="ftr" sz="quarter" idx="11"/>
+          </p:nvPr>
+        </p:nvSpPr>
+        <p:spPr/>
+        <p:txBody>
+          <a:bodyPr/>
+          <a:lstStyle/>
+          <a:p>
+            <a:r>
+              <a:rPr lang="en-US"/>
+              <a:t>Multi-modal Speech Representation Learning</a:t>
+            </a:r>
+            <a:endParaRPr lang="de-DE" dirty="0"/>
+          </a:p>
+        </p:txBody>
+      </p:sp>
+      <p:sp>
+        <p:nvSpPr>
+          <p:cNvPr id="6" name="Foliennummernplatzhalter 5">
+            <a:extLst>
+              <a:ext uri="{FF2B5EF4-FFF2-40B4-BE49-F238E27FC236}">
+                <a16:creationId xmlns:a16="http://schemas.microsoft.com/office/drawing/2014/main" id="{3CBB0A13-9FAD-E04F-A40F-6ACB1B46602C}"/>
+              </a:ext>
+            </a:extLst>
+          </p:cNvPr>
+          <p:cNvSpPr>
+            <a:spLocks noGrp="1"/>
+          </p:cNvSpPr>
+          <p:nvPr>
+            <p:ph type="sldNum" sz="quarter" idx="12"/>
+          </p:nvPr>
+        </p:nvSpPr>
+        <p:spPr/>
+        <p:txBody>
+          <a:bodyPr/>
+          <a:lstStyle/>
+          <a:p>
+            <a:fld id="{4589C08E-11F1-4614-AD94-2F79D605AB8D}" type="slidenum">
+              <a:rPr lang="de-DE" smtClean="0"/>
+              <a:t>19</a:t>
+            </a:fld>
+            <a:endParaRPr lang="de-DE" dirty="0"/>
+          </a:p>
+        </p:txBody>
+      </p:sp>
+    </p:spTree>
+    <p:extLst>
+      <p:ext uri="{BB962C8B-B14F-4D97-AF65-F5344CB8AC3E}">
+        <p14:creationId xmlns:p14="http://schemas.microsoft.com/office/powerpoint/2010/main" val="4083435871"/>
+      </p:ext>
+    </p:extLst>
+  </p:cSld>
+  <p:clrMapOvr>
+    <a:masterClrMapping/>
+  </p:clrMapOvr>
+</p:sld>
+</file>
+
 <file path=ppt/slides/slide2.xml><?xml version="1.0" encoding="utf-8"?>
 <p:sld xmlns:a="http://schemas.openxmlformats.org/drawingml/2006/main" xmlns:r="http://schemas.openxmlformats.org/officeDocument/2006/relationships" xmlns:p="http://schemas.openxmlformats.org/presentationml/2006/main">
   <p:cSld>
@@ -3927,7 +6143,15 @@
           <a:p>
             <a:r>
               <a:rPr lang="de-DE" dirty="0"/>
-              <a:t>First Slide</a:t>
+              <a:t>Speech </a:t>
+            </a:r>
+            <a:r>
+              <a:rPr lang="de-DE" dirty="0" err="1"/>
+              <a:t>Representation</a:t>
+            </a:r>
+            <a:r>
+              <a:rPr lang="de-DE" dirty="0"/>
+              <a:t> Learning</a:t>
             </a:r>
           </a:p>
         </p:txBody>
@@ -3954,9 +6178,88 @@
           <a:lstStyle/>
           <a:p>
             <a:r>
-              <a:rPr lang="de-DE" dirty="0"/>
-              <a:t>Content</a:t>
-            </a:r>
+              <a:rPr lang="de-DE" dirty="0" err="1"/>
+              <a:t>What</a:t>
+            </a:r>
+            <a:r>
+              <a:rPr lang="de-DE" dirty="0"/>
+              <a:t> </a:t>
+            </a:r>
+            <a:r>
+              <a:rPr lang="de-DE" dirty="0" err="1"/>
+              <a:t>is</a:t>
+            </a:r>
+            <a:r>
+              <a:rPr lang="de-DE" dirty="0"/>
+              <a:t> </a:t>
+            </a:r>
+            <a:r>
+              <a:rPr lang="de-DE" dirty="0" err="1"/>
+              <a:t>it</a:t>
+            </a:r>
+            <a:endParaRPr lang="de-DE" dirty="0"/>
+          </a:p>
+          <a:p>
+            <a:r>
+              <a:rPr lang="de-DE" dirty="0" err="1"/>
+              <a:t>Why</a:t>
+            </a:r>
+            <a:r>
+              <a:rPr lang="de-DE" dirty="0"/>
+              <a:t> do </a:t>
+            </a:r>
+            <a:r>
+              <a:rPr lang="de-DE" dirty="0" err="1"/>
+              <a:t>we</a:t>
+            </a:r>
+            <a:r>
+              <a:rPr lang="de-DE" dirty="0"/>
+              <a:t> </a:t>
+            </a:r>
+            <a:r>
+              <a:rPr lang="de-DE" dirty="0" err="1"/>
+              <a:t>need</a:t>
+            </a:r>
+            <a:r>
+              <a:rPr lang="de-DE" dirty="0"/>
+              <a:t> </a:t>
+            </a:r>
+            <a:r>
+              <a:rPr lang="de-DE" dirty="0" err="1"/>
+              <a:t>it</a:t>
+            </a:r>
+            <a:endParaRPr lang="de-DE" dirty="0"/>
+          </a:p>
+          <a:p>
+            <a:r>
+              <a:rPr lang="de-DE" dirty="0" err="1"/>
+              <a:t>Process</a:t>
+            </a:r>
+            <a:r>
+              <a:rPr lang="de-DE" dirty="0"/>
+              <a:t> of </a:t>
+            </a:r>
+            <a:r>
+              <a:rPr lang="de-DE" dirty="0" err="1"/>
+              <a:t>learning</a:t>
+            </a:r>
+            <a:r>
+              <a:rPr lang="de-DE" dirty="0"/>
+              <a:t> </a:t>
+            </a:r>
+            <a:r>
+              <a:rPr lang="de-DE" dirty="0" err="1"/>
+              <a:t>speech</a:t>
+            </a:r>
+            <a:r>
+              <a:rPr lang="de-DE" dirty="0"/>
+              <a:t> </a:t>
+            </a:r>
+            <a:r>
+              <a:rPr lang="de-DE" dirty="0" err="1"/>
+              <a:t>representations</a:t>
+            </a:r>
+            <a:endParaRPr lang="de-DE" dirty="0"/>
           </a:p>
         </p:txBody>
       </p:sp>
@@ -4051,6 +6354,657 @@
     <p:extLst>
       <p:ext uri="{BB962C8B-B14F-4D97-AF65-F5344CB8AC3E}">
         <p14:creationId xmlns:p14="http://schemas.microsoft.com/office/powerpoint/2010/main" val="1757219751"/>
+      </p:ext>
+    </p:extLst>
+  </p:cSld>
+  <p:clrMapOvr>
+    <a:masterClrMapping/>
+  </p:clrMapOvr>
+</p:sld>
+</file>
+
+<file path=ppt/slides/slide20.xml><?xml version="1.0" encoding="utf-8"?>
+<p:sld xmlns:a="http://schemas.openxmlformats.org/drawingml/2006/main" xmlns:r="http://schemas.openxmlformats.org/officeDocument/2006/relationships" xmlns:p="http://schemas.openxmlformats.org/presentationml/2006/main">
+  <p:cSld>
+    <p:spTree>
+      <p:nvGrpSpPr>
+        <p:cNvPr id="1" name=""/>
+        <p:cNvGrpSpPr/>
+        <p:nvPr/>
+      </p:nvGrpSpPr>
+      <p:grpSpPr>
+        <a:xfrm>
+          <a:off x="0" y="0"/>
+          <a:ext cx="0" cy="0"/>
+          <a:chOff x="0" y="0"/>
+          <a:chExt cx="0" cy="0"/>
+        </a:xfrm>
+      </p:grpSpPr>
+      <p:sp>
+        <p:nvSpPr>
+          <p:cNvPr id="2" name="Titel 1">
+            <a:extLst>
+              <a:ext uri="{FF2B5EF4-FFF2-40B4-BE49-F238E27FC236}">
+                <a16:creationId xmlns:a16="http://schemas.microsoft.com/office/drawing/2014/main" id="{30A58369-3EB6-8A8B-ED49-DEFC19AC20F8}"/>
+              </a:ext>
+            </a:extLst>
+          </p:cNvPr>
+          <p:cNvSpPr>
+            <a:spLocks noGrp="1"/>
+          </p:cNvSpPr>
+          <p:nvPr>
+            <p:ph type="title"/>
+          </p:nvPr>
+        </p:nvSpPr>
+        <p:spPr>
+          <a:xfrm>
+            <a:off x="838200" y="358775"/>
+            <a:ext cx="10515600" cy="1325563"/>
+          </a:xfrm>
+        </p:spPr>
+        <p:txBody>
+          <a:bodyPr/>
+          <a:lstStyle/>
+          <a:p>
+            <a:r>
+              <a:rPr lang="de-DE" dirty="0" err="1"/>
+              <a:t>From</a:t>
+            </a:r>
+            <a:r>
+              <a:rPr lang="de-DE" dirty="0"/>
+              <a:t> ILIAS</a:t>
+            </a:r>
+          </a:p>
+        </p:txBody>
+      </p:sp>
+      <p:sp>
+        <p:nvSpPr>
+          <p:cNvPr id="3" name="Inhaltsplatzhalter 2">
+            <a:extLst>
+              <a:ext uri="{FF2B5EF4-FFF2-40B4-BE49-F238E27FC236}">
+                <a16:creationId xmlns:a16="http://schemas.microsoft.com/office/drawing/2014/main" id="{35A851A9-AF82-3EFF-8766-2B38DEE71237}"/>
+              </a:ext>
+            </a:extLst>
+          </p:cNvPr>
+          <p:cNvSpPr>
+            <a:spLocks noGrp="1"/>
+          </p:cNvSpPr>
+          <p:nvPr>
+            <p:ph idx="1"/>
+          </p:nvPr>
+        </p:nvSpPr>
+        <p:spPr/>
+        <p:txBody>
+          <a:bodyPr>
+            <a:normAutofit/>
+          </a:bodyPr>
+          <a:lstStyle/>
+          <a:p>
+            <a:r>
+              <a:rPr lang="en-US" sz="1800" dirty="0">
+                <a:effectLst/>
+                <a:latin typeface="Arial" panose="020B0604020202020204" pitchFamily="34" charset="0"/>
+                <a:cs typeface="Arial" panose="020B0604020202020204" pitchFamily="34" charset="0"/>
+              </a:rPr>
+              <a:t>Self-supervised speech representation learning provides universal models which can used for</a:t>
+            </a:r>
+            <a:br>
+              <a:rPr lang="en-US" sz="1800" dirty="0">
+                <a:effectLst/>
+                <a:latin typeface="Arial" panose="020B0604020202020204" pitchFamily="34" charset="0"/>
+                <a:cs typeface="Arial" panose="020B0604020202020204" pitchFamily="34" charset="0"/>
+              </a:rPr>
+            </a:br>
+            <a:r>
+              <a:rPr lang="en-US" sz="1800" dirty="0">
+                <a:effectLst/>
+                <a:latin typeface="Arial" panose="020B0604020202020204" pitchFamily="34" charset="0"/>
+                <a:cs typeface="Arial" panose="020B0604020202020204" pitchFamily="34" charset="0"/>
+              </a:rPr>
+              <a:t>downstream speech tasks.</a:t>
+            </a:r>
+            <a:endParaRPr lang="en-US" sz="1800" dirty="0">
+              <a:latin typeface="Arial" panose="020B0604020202020204" pitchFamily="34" charset="0"/>
+              <a:cs typeface="Arial" panose="020B0604020202020204" pitchFamily="34" charset="0"/>
+            </a:endParaRPr>
+          </a:p>
+          <a:p>
+            <a:r>
+              <a:rPr lang="en-US" sz="1800" dirty="0">
+                <a:effectLst/>
+                <a:latin typeface="Arial" panose="020B0604020202020204" pitchFamily="34" charset="0"/>
+                <a:cs typeface="Arial" panose="020B0604020202020204" pitchFamily="34" charset="0"/>
+              </a:rPr>
+              <a:t>Using multi-modal data for training such models enables to get better representations and</a:t>
+            </a:r>
+            <a:br>
+              <a:rPr lang="en-US" sz="1800" dirty="0">
+                <a:effectLst/>
+                <a:latin typeface="Arial" panose="020B0604020202020204" pitchFamily="34" charset="0"/>
+                <a:cs typeface="Arial" panose="020B0604020202020204" pitchFamily="34" charset="0"/>
+              </a:rPr>
+            </a:br>
+            <a:r>
+              <a:rPr lang="en-US" sz="1800" dirty="0">
+                <a:effectLst/>
+                <a:latin typeface="Arial" panose="020B0604020202020204" pitchFamily="34" charset="0"/>
+                <a:cs typeface="Arial" panose="020B0604020202020204" pitchFamily="34" charset="0"/>
+              </a:rPr>
+              <a:t>expands the use cases.</a:t>
+            </a:r>
+          </a:p>
+          <a:p>
+            <a:pPr marL="0" indent="0">
+              <a:buNone/>
+            </a:pPr>
+            <a:endParaRPr lang="en-US" sz="1800" dirty="0">
+              <a:latin typeface="Arial" panose="020B0604020202020204" pitchFamily="34" charset="0"/>
+              <a:cs typeface="Arial" panose="020B0604020202020204" pitchFamily="34" charset="0"/>
+            </a:endParaRPr>
+          </a:p>
+          <a:p>
+            <a:pPr marL="0" indent="0">
+              <a:buNone/>
+            </a:pPr>
+            <a:endParaRPr lang="en-US" sz="1800" dirty="0">
+              <a:effectLst/>
+              <a:latin typeface="Arial" panose="020B0604020202020204" pitchFamily="34" charset="0"/>
+              <a:cs typeface="Arial" panose="020B0604020202020204" pitchFamily="34" charset="0"/>
+            </a:endParaRPr>
+          </a:p>
+          <a:p>
+            <a:pPr marL="0" indent="0">
+              <a:buNone/>
+            </a:pPr>
+            <a:endParaRPr lang="en-US" sz="1800" dirty="0">
+              <a:latin typeface="Arial" panose="020B0604020202020204" pitchFamily="34" charset="0"/>
+              <a:cs typeface="Arial" panose="020B0604020202020204" pitchFamily="34" charset="0"/>
+            </a:endParaRPr>
+          </a:p>
+          <a:p>
+            <a:pPr marL="0" indent="0">
+              <a:buNone/>
+            </a:pPr>
+            <a:endParaRPr lang="en-US" sz="1800" dirty="0">
+              <a:effectLst/>
+              <a:latin typeface="Arial" panose="020B0604020202020204" pitchFamily="34" charset="0"/>
+              <a:cs typeface="Arial" panose="020B0604020202020204" pitchFamily="34" charset="0"/>
+            </a:endParaRPr>
+          </a:p>
+          <a:p>
+            <a:pPr marL="0" indent="0">
+              <a:buNone/>
+            </a:pPr>
+            <a:endParaRPr lang="en-US" sz="1800" dirty="0">
+              <a:effectLst/>
+              <a:latin typeface="Arial" panose="020B0604020202020204" pitchFamily="34" charset="0"/>
+              <a:cs typeface="Arial" panose="020B0604020202020204" pitchFamily="34" charset="0"/>
+            </a:endParaRPr>
+          </a:p>
+          <a:p>
+            <a:pPr marL="0" indent="0">
+              <a:buNone/>
+            </a:pPr>
+            <a:r>
+              <a:rPr lang="en-US" sz="800" dirty="0">
+                <a:solidFill>
+                  <a:schemeClr val="bg2">
+                    <a:lumMod val="50000"/>
+                  </a:schemeClr>
+                </a:solidFill>
+                <a:effectLst/>
+              </a:rPr>
+              <a:t>Literature</a:t>
+            </a:r>
+          </a:p>
+          <a:p>
+            <a:pPr marL="0" indent="0">
+              <a:buNone/>
+            </a:pPr>
+            <a:r>
+              <a:rPr lang="en-US" sz="800" dirty="0">
+                <a:solidFill>
+                  <a:schemeClr val="bg2">
+                    <a:lumMod val="50000"/>
+                  </a:schemeClr>
+                </a:solidFill>
+                <a:effectLst/>
+              </a:rPr>
+              <a:t>• [1] Mohamed, Abdelrahman, et al. "Self-supervised speech representation learning: A review." IEEE Journal of Selected Topics in Signal Processing (2022).</a:t>
+            </a:r>
+          </a:p>
+          <a:p>
+            <a:pPr marL="0" indent="0">
+              <a:buNone/>
+            </a:pPr>
+            <a:r>
+              <a:rPr lang="en-US" sz="800" dirty="0">
+                <a:solidFill>
+                  <a:schemeClr val="bg2">
+                    <a:lumMod val="50000"/>
+                  </a:schemeClr>
+                </a:solidFill>
+                <a:effectLst/>
+              </a:rPr>
+              <a:t>• [2] Ao, </a:t>
+            </a:r>
+            <a:r>
+              <a:rPr lang="en-US" sz="800" dirty="0" err="1">
+                <a:solidFill>
+                  <a:schemeClr val="bg2">
+                    <a:lumMod val="50000"/>
+                  </a:schemeClr>
+                </a:solidFill>
+                <a:effectLst/>
+              </a:rPr>
+              <a:t>Junyi</a:t>
+            </a:r>
+            <a:r>
+              <a:rPr lang="en-US" sz="800" dirty="0">
+                <a:solidFill>
+                  <a:schemeClr val="bg2">
+                    <a:lumMod val="50000"/>
+                  </a:schemeClr>
+                </a:solidFill>
+                <a:effectLst/>
+              </a:rPr>
+              <a:t>, et al. "Speecht5: Unified-modal encoder-decoder pre-training for spoken language processing." ACL (2022).</a:t>
+            </a:r>
+          </a:p>
+          <a:p>
+            <a:pPr marL="0" indent="0">
+              <a:buNone/>
+            </a:pPr>
+            <a:r>
+              <a:rPr lang="en-US" sz="800" dirty="0">
+                <a:solidFill>
+                  <a:schemeClr val="bg2">
+                    <a:lumMod val="50000"/>
+                  </a:schemeClr>
+                </a:solidFill>
+                <a:effectLst/>
+              </a:rPr>
+              <a:t>• [3] Zhu, </a:t>
+            </a:r>
+            <a:r>
+              <a:rPr lang="en-US" sz="800" dirty="0" err="1">
+                <a:solidFill>
+                  <a:schemeClr val="bg2">
+                    <a:lumMod val="50000"/>
+                  </a:schemeClr>
+                </a:solidFill>
+                <a:effectLst/>
+              </a:rPr>
+              <a:t>Qiushi</a:t>
+            </a:r>
+            <a:r>
+              <a:rPr lang="en-US" sz="800" dirty="0">
+                <a:solidFill>
+                  <a:schemeClr val="bg2">
+                    <a:lumMod val="50000"/>
+                  </a:schemeClr>
+                </a:solidFill>
+                <a:effectLst/>
+              </a:rPr>
+              <a:t>, et al. "</a:t>
+            </a:r>
+            <a:r>
+              <a:rPr lang="en-US" sz="800" dirty="0" err="1">
+                <a:solidFill>
+                  <a:schemeClr val="bg2">
+                    <a:lumMod val="50000"/>
+                  </a:schemeClr>
+                </a:solidFill>
+                <a:effectLst/>
+              </a:rPr>
+              <a:t>Vatlm</a:t>
+            </a:r>
+            <a:r>
+              <a:rPr lang="en-US" sz="800" dirty="0">
+                <a:solidFill>
+                  <a:schemeClr val="bg2">
+                    <a:lumMod val="50000"/>
+                  </a:schemeClr>
+                </a:solidFill>
+                <a:effectLst/>
+              </a:rPr>
+              <a:t>: Visual-audio-text pre-training with unified masked prediction for speech representation learning." IEEE Transactions on Multimedia (2023).</a:t>
+            </a:r>
+          </a:p>
+          <a:p>
+            <a:pPr marL="0" indent="0">
+              <a:buNone/>
+            </a:pPr>
+            <a:r>
+              <a:rPr lang="en-US" sz="800" dirty="0">
+                <a:solidFill>
+                  <a:schemeClr val="bg2">
+                    <a:lumMod val="50000"/>
+                  </a:schemeClr>
+                </a:solidFill>
+                <a:effectLst/>
+              </a:rPr>
+              <a:t>• [4] Shi, Bowen, et al. "Learning audio-visual speech representation by masked multimodal cluster prediction." ICLR (2022).</a:t>
+            </a:r>
+          </a:p>
+          <a:p>
+            <a:endParaRPr lang="de-DE" dirty="0"/>
+          </a:p>
+        </p:txBody>
+      </p:sp>
+      <p:sp>
+        <p:nvSpPr>
+          <p:cNvPr id="4" name="Datumsplatzhalter 3">
+            <a:extLst>
+              <a:ext uri="{FF2B5EF4-FFF2-40B4-BE49-F238E27FC236}">
+                <a16:creationId xmlns:a16="http://schemas.microsoft.com/office/drawing/2014/main" id="{EDD15EFB-FF5B-B4CA-55B9-6CC35A8EAF12}"/>
+              </a:ext>
+            </a:extLst>
+          </p:cNvPr>
+          <p:cNvSpPr>
+            <a:spLocks noGrp="1"/>
+          </p:cNvSpPr>
+          <p:nvPr>
+            <p:ph type="dt" sz="half" idx="10"/>
+          </p:nvPr>
+        </p:nvSpPr>
+        <p:spPr/>
+        <p:txBody>
+          <a:bodyPr/>
+          <a:lstStyle/>
+          <a:p>
+            <a:r>
+              <a:rPr lang="de-DE"/>
+              <a:t>05.12.2023</a:t>
+            </a:r>
+            <a:endParaRPr lang="de-DE" dirty="0"/>
+          </a:p>
+        </p:txBody>
+      </p:sp>
+      <p:sp>
+        <p:nvSpPr>
+          <p:cNvPr id="5" name="Fußzeilenplatzhalter 4">
+            <a:extLst>
+              <a:ext uri="{FF2B5EF4-FFF2-40B4-BE49-F238E27FC236}">
+                <a16:creationId xmlns:a16="http://schemas.microsoft.com/office/drawing/2014/main" id="{E7A447EA-958C-B9A2-64C2-FF1D7A366BDC}"/>
+              </a:ext>
+            </a:extLst>
+          </p:cNvPr>
+          <p:cNvSpPr>
+            <a:spLocks noGrp="1"/>
+          </p:cNvSpPr>
+          <p:nvPr>
+            <p:ph type="ftr" sz="quarter" idx="11"/>
+          </p:nvPr>
+        </p:nvSpPr>
+        <p:spPr/>
+        <p:txBody>
+          <a:bodyPr/>
+          <a:lstStyle/>
+          <a:p>
+            <a:r>
+              <a:rPr lang="en-US"/>
+              <a:t>Multi-modal Speech Representation Learning</a:t>
+            </a:r>
+            <a:endParaRPr lang="de-DE" dirty="0"/>
+          </a:p>
+        </p:txBody>
+      </p:sp>
+      <p:sp>
+        <p:nvSpPr>
+          <p:cNvPr id="6" name="Foliennummernplatzhalter 5">
+            <a:extLst>
+              <a:ext uri="{FF2B5EF4-FFF2-40B4-BE49-F238E27FC236}">
+                <a16:creationId xmlns:a16="http://schemas.microsoft.com/office/drawing/2014/main" id="{0FA6D437-CFB6-C4C0-C250-EE2D2D7DD2FA}"/>
+              </a:ext>
+            </a:extLst>
+          </p:cNvPr>
+          <p:cNvSpPr>
+            <a:spLocks noGrp="1"/>
+          </p:cNvSpPr>
+          <p:nvPr>
+            <p:ph type="sldNum" sz="quarter" idx="12"/>
+          </p:nvPr>
+        </p:nvSpPr>
+        <p:spPr/>
+        <p:txBody>
+          <a:bodyPr/>
+          <a:lstStyle/>
+          <a:p>
+            <a:fld id="{4589C08E-11F1-4614-AD94-2F79D605AB8D}" type="slidenum">
+              <a:rPr lang="de-DE" smtClean="0"/>
+              <a:t>20</a:t>
+            </a:fld>
+            <a:endParaRPr lang="de-DE" dirty="0"/>
+          </a:p>
+        </p:txBody>
+      </p:sp>
+    </p:spTree>
+    <p:extLst>
+      <p:ext uri="{BB962C8B-B14F-4D97-AF65-F5344CB8AC3E}">
+        <p14:creationId xmlns:p14="http://schemas.microsoft.com/office/powerpoint/2010/main" val="3496448324"/>
+      </p:ext>
+    </p:extLst>
+  </p:cSld>
+  <p:clrMapOvr>
+    <a:masterClrMapping/>
+  </p:clrMapOvr>
+</p:sld>
+</file>
+
+<file path=ppt/slides/slide21.xml><?xml version="1.0" encoding="utf-8"?>
+<p:sld xmlns:a="http://schemas.openxmlformats.org/drawingml/2006/main" xmlns:r="http://schemas.openxmlformats.org/officeDocument/2006/relationships" xmlns:p="http://schemas.openxmlformats.org/presentationml/2006/main">
+  <p:cSld>
+    <p:spTree>
+      <p:nvGrpSpPr>
+        <p:cNvPr id="1" name=""/>
+        <p:cNvGrpSpPr/>
+        <p:nvPr/>
+      </p:nvGrpSpPr>
+      <p:grpSpPr>
+        <a:xfrm>
+          <a:off x="0" y="0"/>
+          <a:ext cx="0" cy="0"/>
+          <a:chOff x="0" y="0"/>
+          <a:chExt cx="0" cy="0"/>
+        </a:xfrm>
+      </p:grpSpPr>
+      <p:sp>
+        <p:nvSpPr>
+          <p:cNvPr id="2" name="Titel 1">
+            <a:extLst>
+              <a:ext uri="{FF2B5EF4-FFF2-40B4-BE49-F238E27FC236}">
+                <a16:creationId xmlns:a16="http://schemas.microsoft.com/office/drawing/2014/main" id="{7ED805BA-22DB-7C3F-FA81-EBDA00F3079D}"/>
+              </a:ext>
+            </a:extLst>
+          </p:cNvPr>
+          <p:cNvSpPr>
+            <a:spLocks noGrp="1"/>
+          </p:cNvSpPr>
+          <p:nvPr>
+            <p:ph type="title"/>
+          </p:nvPr>
+        </p:nvSpPr>
+        <p:spPr/>
+        <p:txBody>
+          <a:bodyPr/>
+          <a:lstStyle/>
+          <a:p>
+            <a:r>
+              <a:rPr lang="de-DE" dirty="0" err="1"/>
+              <a:t>Presentation</a:t>
+            </a:r>
+            <a:r>
+              <a:rPr lang="de-DE" dirty="0"/>
+              <a:t> </a:t>
+            </a:r>
+            <a:r>
+              <a:rPr lang="de-DE" dirty="0" err="1"/>
+              <a:t>metadata</a:t>
+            </a:r>
+            <a:endParaRPr lang="de-DE" dirty="0"/>
+          </a:p>
+        </p:txBody>
+      </p:sp>
+      <p:sp>
+        <p:nvSpPr>
+          <p:cNvPr id="3" name="Inhaltsplatzhalter 2">
+            <a:extLst>
+              <a:ext uri="{FF2B5EF4-FFF2-40B4-BE49-F238E27FC236}">
+                <a16:creationId xmlns:a16="http://schemas.microsoft.com/office/drawing/2014/main" id="{785CE866-7610-D846-8EC9-42B4A6E74904}"/>
+              </a:ext>
+            </a:extLst>
+          </p:cNvPr>
+          <p:cNvSpPr>
+            <a:spLocks noGrp="1"/>
+          </p:cNvSpPr>
+          <p:nvPr>
+            <p:ph idx="1"/>
+          </p:nvPr>
+        </p:nvSpPr>
+        <p:spPr/>
+        <p:txBody>
+          <a:bodyPr>
+            <a:normAutofit/>
+          </a:bodyPr>
+          <a:lstStyle/>
+          <a:p>
+            <a:r>
+              <a:rPr lang="de-DE" b="1" dirty="0" err="1"/>
+              <a:t>two</a:t>
+            </a:r>
+            <a:r>
+              <a:rPr lang="de-DE" b="1" dirty="0"/>
+              <a:t> </a:t>
+            </a:r>
+            <a:r>
+              <a:rPr lang="de-DE" b="1" dirty="0" err="1"/>
+              <a:t>minutes</a:t>
+            </a:r>
+            <a:r>
+              <a:rPr lang="de-DE" b="1" dirty="0"/>
+              <a:t> per </a:t>
+            </a:r>
+            <a:r>
+              <a:rPr lang="de-DE" b="1" dirty="0" err="1"/>
+              <a:t>slide</a:t>
+            </a:r>
+            <a:r>
+              <a:rPr lang="de-DE" b="1" dirty="0"/>
+              <a:t> </a:t>
+            </a:r>
+            <a:r>
+              <a:rPr lang="de-DE" b="1" dirty="0">
+                <a:sym typeface="Wingdings" panose="05000000000000000000" pitchFamily="2" charset="2"/>
+              </a:rPr>
+              <a:t> ~</a:t>
+            </a:r>
+            <a:r>
+              <a:rPr lang="de-DE" b="1">
+                <a:sym typeface="Wingdings" panose="05000000000000000000" pitchFamily="2" charset="2"/>
+              </a:rPr>
+              <a:t>12.5 Slides</a:t>
+            </a:r>
+          </a:p>
+          <a:p>
+            <a:pPr marL="0" indent="0">
+              <a:buNone/>
+            </a:pPr>
+            <a:endParaRPr lang="de-DE" b="1" dirty="0"/>
+          </a:p>
+        </p:txBody>
+      </p:sp>
+      <p:sp>
+        <p:nvSpPr>
+          <p:cNvPr id="4" name="Datumsplatzhalter 3">
+            <a:extLst>
+              <a:ext uri="{FF2B5EF4-FFF2-40B4-BE49-F238E27FC236}">
+                <a16:creationId xmlns:a16="http://schemas.microsoft.com/office/drawing/2014/main" id="{3A3F07CD-B7D8-56ED-F1C0-AD943813A33D}"/>
+              </a:ext>
+            </a:extLst>
+          </p:cNvPr>
+          <p:cNvSpPr>
+            <a:spLocks noGrp="1"/>
+          </p:cNvSpPr>
+          <p:nvPr>
+            <p:ph type="dt" sz="half" idx="10"/>
+          </p:nvPr>
+        </p:nvSpPr>
+        <p:spPr/>
+        <p:txBody>
+          <a:bodyPr/>
+          <a:lstStyle/>
+          <a:p>
+            <a:r>
+              <a:rPr lang="de-DE"/>
+              <a:t>05.12.2023</a:t>
+            </a:r>
+            <a:endParaRPr lang="de-DE" dirty="0"/>
+          </a:p>
+        </p:txBody>
+      </p:sp>
+      <p:sp>
+        <p:nvSpPr>
+          <p:cNvPr id="5" name="Fußzeilenplatzhalter 4">
+            <a:extLst>
+              <a:ext uri="{FF2B5EF4-FFF2-40B4-BE49-F238E27FC236}">
+                <a16:creationId xmlns:a16="http://schemas.microsoft.com/office/drawing/2014/main" id="{BB74E4BF-436F-2407-CCA7-6DF73948D4BC}"/>
+              </a:ext>
+            </a:extLst>
+          </p:cNvPr>
+          <p:cNvSpPr>
+            <a:spLocks noGrp="1"/>
+          </p:cNvSpPr>
+          <p:nvPr>
+            <p:ph type="ftr" sz="quarter" idx="11"/>
+          </p:nvPr>
+        </p:nvSpPr>
+        <p:spPr/>
+        <p:txBody>
+          <a:bodyPr/>
+          <a:lstStyle/>
+          <a:p>
+            <a:r>
+              <a:rPr lang="en-US"/>
+              <a:t>Multi-modal Speech Representation Learning</a:t>
+            </a:r>
+            <a:endParaRPr lang="de-DE" dirty="0"/>
+          </a:p>
+        </p:txBody>
+      </p:sp>
+      <p:sp>
+        <p:nvSpPr>
+          <p:cNvPr id="6" name="Foliennummernplatzhalter 5">
+            <a:extLst>
+              <a:ext uri="{FF2B5EF4-FFF2-40B4-BE49-F238E27FC236}">
+                <a16:creationId xmlns:a16="http://schemas.microsoft.com/office/drawing/2014/main" id="{168096F9-3FB5-0C55-D6F4-1BCA6D935B80}"/>
+              </a:ext>
+            </a:extLst>
+          </p:cNvPr>
+          <p:cNvSpPr>
+            <a:spLocks noGrp="1"/>
+          </p:cNvSpPr>
+          <p:nvPr>
+            <p:ph type="sldNum" sz="quarter" idx="12"/>
+          </p:nvPr>
+        </p:nvSpPr>
+        <p:spPr/>
+        <p:txBody>
+          <a:bodyPr/>
+          <a:lstStyle/>
+          <a:p>
+            <a:fld id="{4589C08E-11F1-4614-AD94-2F79D605AB8D}" type="slidenum">
+              <a:rPr lang="de-DE" smtClean="0"/>
+              <a:t>21</a:t>
+            </a:fld>
+            <a:endParaRPr lang="de-DE" dirty="0"/>
+          </a:p>
+        </p:txBody>
+      </p:sp>
+    </p:spTree>
+    <p:extLst>
+      <p:ext uri="{BB962C8B-B14F-4D97-AF65-F5344CB8AC3E}">
+        <p14:creationId xmlns:p14="http://schemas.microsoft.com/office/powerpoint/2010/main" val="2915824135"/>
       </p:ext>
     </p:extLst>
   </p:cSld>
@@ -4100,7 +7054,15 @@
           <a:p>
             <a:r>
               <a:rPr lang="de-DE" dirty="0"/>
-              <a:t>Second Slide</a:t>
+              <a:t>History of Speech </a:t>
+            </a:r>
+            <a:r>
+              <a:rPr lang="de-DE" dirty="0" err="1"/>
+              <a:t>Representation</a:t>
+            </a:r>
+            <a:r>
+              <a:rPr lang="de-DE" dirty="0"/>
+              <a:t> Learning</a:t>
             </a:r>
           </a:p>
         </p:txBody>
@@ -4128,12 +7090,35 @@
           <a:p>
             <a:r>
               <a:rPr lang="de-DE" dirty="0"/>
-              <a:t>More </a:t>
-            </a:r>
-            <a:r>
-              <a:rPr lang="en-GB" dirty="0"/>
-              <a:t>content</a:t>
-            </a:r>
+              <a:t>Early </a:t>
+            </a:r>
+            <a:r>
+              <a:rPr lang="de-DE" dirty="0" err="1"/>
+              <a:t>approaches</a:t>
+            </a:r>
+            <a:endParaRPr lang="de-DE" dirty="0"/>
+          </a:p>
+          <a:p>
+            <a:r>
+              <a:rPr lang="de-DE" dirty="0"/>
+              <a:t>Single </a:t>
+            </a:r>
+            <a:r>
+              <a:rPr lang="de-DE" dirty="0" err="1"/>
+              <a:t>mode</a:t>
+            </a:r>
+            <a:r>
+              <a:rPr lang="de-DE" dirty="0"/>
+              <a:t> </a:t>
+            </a:r>
+            <a:r>
+              <a:rPr lang="de-DE" dirty="0" err="1"/>
+              <a:t>learning</a:t>
+            </a:r>
+            <a:endParaRPr lang="de-DE" dirty="0"/>
+          </a:p>
+          <a:p>
+            <a:endParaRPr lang="en-GB" dirty="0"/>
           </a:p>
         </p:txBody>
       </p:sp>
@@ -4259,7 +7244,7 @@
           <p:cNvPr id="2" name="Titel 1">
             <a:extLst>
               <a:ext uri="{FF2B5EF4-FFF2-40B4-BE49-F238E27FC236}">
-                <a16:creationId xmlns:a16="http://schemas.microsoft.com/office/drawing/2014/main" id="{30A58369-3EB6-8A8B-ED49-DEFC19AC20F8}"/>
+                <a16:creationId xmlns:a16="http://schemas.microsoft.com/office/drawing/2014/main" id="{64C72F1A-8422-2279-853A-18490E33583F}"/>
               </a:ext>
             </a:extLst>
           </p:cNvPr>
@@ -4270,24 +7255,24 @@
             <p:ph type="title"/>
           </p:nvPr>
         </p:nvSpPr>
-        <p:spPr>
-          <a:xfrm>
-            <a:off x="838200" y="358775"/>
-            <a:ext cx="10515600" cy="1325563"/>
-          </a:xfrm>
-        </p:spPr>
+        <p:spPr/>
         <p:txBody>
           <a:bodyPr/>
           <a:lstStyle/>
           <a:p>
             <a:r>
               <a:rPr lang="de-DE" dirty="0" err="1"/>
-              <a:t>From</a:t>
-            </a:r>
-            <a:r>
-              <a:rPr lang="de-DE" dirty="0"/>
-              <a:t> ILIAS</a:t>
-            </a:r>
+              <a:t>Requirements</a:t>
+            </a:r>
+            <a:r>
+              <a:rPr lang="de-DE" dirty="0"/>
+              <a:t> of Speech </a:t>
+            </a:r>
+            <a:r>
+              <a:rPr lang="de-DE" dirty="0" err="1"/>
+              <a:t>Representations</a:t>
+            </a:r>
+            <a:endParaRPr lang="de-DE" dirty="0"/>
           </a:p>
         </p:txBody>
       </p:sp>
@@ -4296,7 +7281,7 @@
           <p:cNvPr id="3" name="Inhaltsplatzhalter 2">
             <a:extLst>
               <a:ext uri="{FF2B5EF4-FFF2-40B4-BE49-F238E27FC236}">
-                <a16:creationId xmlns:a16="http://schemas.microsoft.com/office/drawing/2014/main" id="{35A851A9-AF82-3EFF-8766-2B38DEE71237}"/>
+                <a16:creationId xmlns:a16="http://schemas.microsoft.com/office/drawing/2014/main" id="{AF88B905-BEC9-9440-7270-BBFF1996D0D4}"/>
               </a:ext>
             </a:extLst>
           </p:cNvPr>
@@ -4309,260 +7294,41 @@
         </p:nvSpPr>
         <p:spPr/>
         <p:txBody>
-          <a:bodyPr>
-            <a:normAutofit/>
-          </a:bodyPr>
-          <a:lstStyle/>
-          <a:p>
-            <a:r>
-              <a:rPr lang="en-US" sz="1800" dirty="0">
-                <a:effectLst/>
-                <a:latin typeface="Arial" panose="020B0604020202020204" pitchFamily="34" charset="0"/>
-                <a:cs typeface="Arial" panose="020B0604020202020204" pitchFamily="34" charset="0"/>
-              </a:rPr>
-              <a:t>Self-supervised speech representation learning provides universal models which can used for</a:t>
-            </a:r>
-            <a:br>
-              <a:rPr lang="en-US" sz="1800" dirty="0">
-                <a:effectLst/>
-                <a:latin typeface="Arial" panose="020B0604020202020204" pitchFamily="34" charset="0"/>
-                <a:cs typeface="Arial" panose="020B0604020202020204" pitchFamily="34" charset="0"/>
-              </a:rPr>
-            </a:br>
-            <a:r>
-              <a:rPr lang="en-US" sz="1800" dirty="0">
-                <a:effectLst/>
-                <a:latin typeface="Arial" panose="020B0604020202020204" pitchFamily="34" charset="0"/>
-                <a:cs typeface="Arial" panose="020B0604020202020204" pitchFamily="34" charset="0"/>
-              </a:rPr>
-              <a:t>downstream speech tasks.</a:t>
-            </a:r>
-            <a:endParaRPr lang="en-US" sz="1800" dirty="0">
-              <a:latin typeface="Arial" panose="020B0604020202020204" pitchFamily="34" charset="0"/>
-              <a:cs typeface="Arial" panose="020B0604020202020204" pitchFamily="34" charset="0"/>
-            </a:endParaRPr>
-          </a:p>
-          <a:p>
-            <a:r>
-              <a:rPr lang="en-US" sz="1800" dirty="0">
-                <a:effectLst/>
-                <a:latin typeface="Arial" panose="020B0604020202020204" pitchFamily="34" charset="0"/>
-                <a:cs typeface="Arial" panose="020B0604020202020204" pitchFamily="34" charset="0"/>
-              </a:rPr>
-              <a:t>Using multi-modal data for training such models enables to get better representations and</a:t>
-            </a:r>
-            <a:br>
-              <a:rPr lang="en-US" sz="1800" dirty="0">
-                <a:effectLst/>
-                <a:latin typeface="Arial" panose="020B0604020202020204" pitchFamily="34" charset="0"/>
-                <a:cs typeface="Arial" panose="020B0604020202020204" pitchFamily="34" charset="0"/>
-              </a:rPr>
-            </a:br>
-            <a:r>
-              <a:rPr lang="en-US" sz="1800" dirty="0">
-                <a:effectLst/>
-                <a:latin typeface="Arial" panose="020B0604020202020204" pitchFamily="34" charset="0"/>
-                <a:cs typeface="Arial" panose="020B0604020202020204" pitchFamily="34" charset="0"/>
-              </a:rPr>
-              <a:t>expands the use cases.</a:t>
-            </a:r>
-          </a:p>
-          <a:p>
-            <a:pPr marL="0" indent="0">
-              <a:buNone/>
-            </a:pPr>
-            <a:endParaRPr lang="en-US" sz="1800" dirty="0">
-              <a:latin typeface="Arial" panose="020B0604020202020204" pitchFamily="34" charset="0"/>
-              <a:cs typeface="Arial" panose="020B0604020202020204" pitchFamily="34" charset="0"/>
-            </a:endParaRPr>
-          </a:p>
-          <a:p>
-            <a:pPr marL="0" indent="0">
-              <a:buNone/>
-            </a:pPr>
-            <a:endParaRPr lang="en-US" sz="1800" dirty="0">
-              <a:effectLst/>
-              <a:latin typeface="Arial" panose="020B0604020202020204" pitchFamily="34" charset="0"/>
-              <a:cs typeface="Arial" panose="020B0604020202020204" pitchFamily="34" charset="0"/>
-            </a:endParaRPr>
-          </a:p>
-          <a:p>
-            <a:pPr marL="0" indent="0">
-              <a:buNone/>
-            </a:pPr>
-            <a:endParaRPr lang="en-US" sz="1800" dirty="0">
-              <a:latin typeface="Arial" panose="020B0604020202020204" pitchFamily="34" charset="0"/>
-              <a:cs typeface="Arial" panose="020B0604020202020204" pitchFamily="34" charset="0"/>
-            </a:endParaRPr>
-          </a:p>
-          <a:p>
-            <a:pPr marL="0" indent="0">
-              <a:buNone/>
-            </a:pPr>
-            <a:endParaRPr lang="en-US" sz="1800" dirty="0">
-              <a:effectLst/>
-              <a:latin typeface="Arial" panose="020B0604020202020204" pitchFamily="34" charset="0"/>
-              <a:cs typeface="Arial" panose="020B0604020202020204" pitchFamily="34" charset="0"/>
-            </a:endParaRPr>
-          </a:p>
-          <a:p>
-            <a:pPr marL="0" indent="0">
-              <a:buNone/>
-            </a:pPr>
-            <a:endParaRPr lang="en-US" sz="1800" dirty="0">
-              <a:effectLst/>
-              <a:latin typeface="Arial" panose="020B0604020202020204" pitchFamily="34" charset="0"/>
-              <a:cs typeface="Arial" panose="020B0604020202020204" pitchFamily="34" charset="0"/>
-            </a:endParaRPr>
-          </a:p>
-          <a:p>
-            <a:pPr marL="0" indent="0">
-              <a:buNone/>
-            </a:pPr>
-            <a:r>
-              <a:rPr lang="en-US" sz="800" dirty="0">
-                <a:solidFill>
-                  <a:schemeClr val="bg2">
-                    <a:lumMod val="50000"/>
-                  </a:schemeClr>
-                </a:solidFill>
-                <a:effectLst/>
-              </a:rPr>
-              <a:t>Literature</a:t>
-            </a:r>
-          </a:p>
-          <a:p>
-            <a:pPr marL="0" indent="0">
-              <a:buNone/>
-            </a:pPr>
-            <a:r>
-              <a:rPr lang="en-US" sz="800" dirty="0">
-                <a:solidFill>
-                  <a:schemeClr val="bg2">
-                    <a:lumMod val="50000"/>
-                  </a:schemeClr>
-                </a:solidFill>
-                <a:effectLst/>
-              </a:rPr>
-              <a:t>• [1] Mohamed, Abdelrahman, et al. "Self-supervised speech representation learning: A review." IEEE Journal of Selected Topics in Signal Processing (2022).</a:t>
-            </a:r>
-          </a:p>
-          <a:p>
-            <a:pPr marL="0" indent="0">
-              <a:buNone/>
-            </a:pPr>
-            <a:r>
-              <a:rPr lang="en-US" sz="800" dirty="0">
-                <a:solidFill>
-                  <a:schemeClr val="bg2">
-                    <a:lumMod val="50000"/>
-                  </a:schemeClr>
-                </a:solidFill>
-                <a:effectLst/>
-              </a:rPr>
-              <a:t>• [2] Ao, </a:t>
-            </a:r>
-            <a:r>
-              <a:rPr lang="en-US" sz="800" dirty="0" err="1">
-                <a:solidFill>
-                  <a:schemeClr val="bg2">
-                    <a:lumMod val="50000"/>
-                  </a:schemeClr>
-                </a:solidFill>
-                <a:effectLst/>
-              </a:rPr>
-              <a:t>Junyi</a:t>
-            </a:r>
-            <a:r>
-              <a:rPr lang="en-US" sz="800" dirty="0">
-                <a:solidFill>
-                  <a:schemeClr val="bg2">
-                    <a:lumMod val="50000"/>
-                  </a:schemeClr>
-                </a:solidFill>
-                <a:effectLst/>
-              </a:rPr>
-              <a:t>, et al. "Speecht5: Unified-modal encoder-decoder pre-training for spoken language processing." ACL (2022).</a:t>
-            </a:r>
-          </a:p>
-          <a:p>
-            <a:pPr marL="0" indent="0">
-              <a:buNone/>
-            </a:pPr>
-            <a:r>
-              <a:rPr lang="en-US" sz="800" dirty="0">
-                <a:solidFill>
-                  <a:schemeClr val="bg2">
-                    <a:lumMod val="50000"/>
-                  </a:schemeClr>
-                </a:solidFill>
-                <a:effectLst/>
-              </a:rPr>
-              <a:t>• [3] Zhu, </a:t>
-            </a:r>
-            <a:r>
-              <a:rPr lang="en-US" sz="800" dirty="0" err="1">
-                <a:solidFill>
-                  <a:schemeClr val="bg2">
-                    <a:lumMod val="50000"/>
-                  </a:schemeClr>
-                </a:solidFill>
-                <a:effectLst/>
-              </a:rPr>
-              <a:t>Qiushi</a:t>
-            </a:r>
-            <a:r>
-              <a:rPr lang="en-US" sz="800" dirty="0">
-                <a:solidFill>
-                  <a:schemeClr val="bg2">
-                    <a:lumMod val="50000"/>
-                  </a:schemeClr>
-                </a:solidFill>
-                <a:effectLst/>
-              </a:rPr>
-              <a:t>, et al. "</a:t>
-            </a:r>
-            <a:r>
-              <a:rPr lang="en-US" sz="800" dirty="0" err="1">
-                <a:solidFill>
-                  <a:schemeClr val="bg2">
-                    <a:lumMod val="50000"/>
-                  </a:schemeClr>
-                </a:solidFill>
-                <a:effectLst/>
-              </a:rPr>
-              <a:t>Vatlm</a:t>
-            </a:r>
-            <a:r>
-              <a:rPr lang="en-US" sz="800" dirty="0">
-                <a:solidFill>
-                  <a:schemeClr val="bg2">
-                    <a:lumMod val="50000"/>
-                  </a:schemeClr>
-                </a:solidFill>
-                <a:effectLst/>
-              </a:rPr>
-              <a:t>: Visual-audio-text pre-training with unified masked prediction for speech representation learning." IEEE Transactions on Multimedia (2023).</a:t>
-            </a:r>
-          </a:p>
-          <a:p>
-            <a:pPr marL="0" indent="0">
-              <a:buNone/>
-            </a:pPr>
-            <a:r>
-              <a:rPr lang="en-US" sz="800" dirty="0">
-                <a:solidFill>
-                  <a:schemeClr val="bg2">
-                    <a:lumMod val="50000"/>
-                  </a:schemeClr>
-                </a:solidFill>
-                <a:effectLst/>
-              </a:rPr>
-              <a:t>• [4] Shi, Bowen, et al. "Learning audio-visual speech representation by masked multimodal cluster prediction." ICLR (2022).</a:t>
-            </a:r>
-          </a:p>
-          <a:p>
-            <a:endParaRPr lang="de-DE" dirty="0"/>
+          <a:bodyPr/>
+          <a:lstStyle/>
+          <a:p>
+            <a:r>
+              <a:rPr lang="de-DE" dirty="0" err="1"/>
+              <a:t>Where</a:t>
+            </a:r>
+            <a:r>
+              <a:rPr lang="de-DE" dirty="0"/>
+              <a:t> in </a:t>
+            </a:r>
+            <a:r>
+              <a:rPr lang="de-DE" dirty="0" err="1"/>
+              <a:t>paper</a:t>
+            </a:r>
+            <a:r>
+              <a:rPr lang="de-DE" dirty="0"/>
+              <a:t> was </a:t>
+            </a:r>
+            <a:r>
+              <a:rPr lang="de-DE" dirty="0" err="1"/>
+              <a:t>this</a:t>
+            </a:r>
+            <a:r>
+              <a:rPr lang="de-DE" dirty="0"/>
+              <a:t>? </a:t>
+            </a:r>
+            <a:r>
+              <a:rPr lang="de-DE" dirty="0" err="1"/>
+              <a:t>Possibly</a:t>
+            </a:r>
+            <a:r>
+              <a:rPr lang="de-DE" dirty="0"/>
+              <a:t> review</a:t>
+            </a:r>
           </a:p>
         </p:txBody>
       </p:sp>
@@ -4571,7 +7337,7 @@
           <p:cNvPr id="4" name="Datumsplatzhalter 3">
             <a:extLst>
               <a:ext uri="{FF2B5EF4-FFF2-40B4-BE49-F238E27FC236}">
-                <a16:creationId xmlns:a16="http://schemas.microsoft.com/office/drawing/2014/main" id="{EDD15EFB-FF5B-B4CA-55B9-6CC35A8EAF12}"/>
+                <a16:creationId xmlns:a16="http://schemas.microsoft.com/office/drawing/2014/main" id="{0181EC9C-43AB-D74F-1FC5-254FAFEFAF72}"/>
               </a:ext>
             </a:extLst>
           </p:cNvPr>
@@ -4600,7 +7366,7 @@
           <p:cNvPr id="5" name="Fußzeilenplatzhalter 4">
             <a:extLst>
               <a:ext uri="{FF2B5EF4-FFF2-40B4-BE49-F238E27FC236}">
-                <a16:creationId xmlns:a16="http://schemas.microsoft.com/office/drawing/2014/main" id="{E7A447EA-958C-B9A2-64C2-FF1D7A366BDC}"/>
+                <a16:creationId xmlns:a16="http://schemas.microsoft.com/office/drawing/2014/main" id="{77AB99A6-3C32-E43E-15D8-1FB9D9215B6B}"/>
               </a:ext>
             </a:extLst>
           </p:cNvPr>
@@ -4629,7 +7395,7 @@
           <p:cNvPr id="6" name="Foliennummernplatzhalter 5">
             <a:extLst>
               <a:ext uri="{FF2B5EF4-FFF2-40B4-BE49-F238E27FC236}">
-                <a16:creationId xmlns:a16="http://schemas.microsoft.com/office/drawing/2014/main" id="{0FA6D437-CFB6-C4C0-C250-EE2D2D7DD2FA}"/>
+                <a16:creationId xmlns:a16="http://schemas.microsoft.com/office/drawing/2014/main" id="{BF0FFA8E-2439-CD60-2906-CB99CE2AA93C}"/>
               </a:ext>
             </a:extLst>
           </p:cNvPr>
@@ -4656,7 +7422,7 @@
     </p:spTree>
     <p:extLst>
       <p:ext uri="{BB962C8B-B14F-4D97-AF65-F5344CB8AC3E}">
-        <p14:creationId xmlns:p14="http://schemas.microsoft.com/office/powerpoint/2010/main" val="3496448324"/>
+        <p14:creationId xmlns:p14="http://schemas.microsoft.com/office/powerpoint/2010/main" val="3802131508"/>
       </p:ext>
     </p:extLst>
   </p:cSld>
@@ -4688,7 +7454,7 @@
           <p:cNvPr id="2" name="Titel 1">
             <a:extLst>
               <a:ext uri="{FF2B5EF4-FFF2-40B4-BE49-F238E27FC236}">
-                <a16:creationId xmlns:a16="http://schemas.microsoft.com/office/drawing/2014/main" id="{7ED805BA-22DB-7C3F-FA81-EBDA00F3079D}"/>
+                <a16:creationId xmlns:a16="http://schemas.microsoft.com/office/drawing/2014/main" id="{6DB18720-ED9F-654B-2B6C-03B904FD3A76}"/>
               </a:ext>
             </a:extLst>
           </p:cNvPr>
@@ -4705,8 +7471,36 @@
           <a:lstStyle/>
           <a:p>
             <a:r>
+              <a:rPr lang="de-DE" dirty="0"/>
+              <a:t>Data</a:t>
+            </a:r>
+          </a:p>
+        </p:txBody>
+      </p:sp>
+      <p:sp>
+        <p:nvSpPr>
+          <p:cNvPr id="3" name="Inhaltsplatzhalter 2">
+            <a:extLst>
+              <a:ext uri="{FF2B5EF4-FFF2-40B4-BE49-F238E27FC236}">
+                <a16:creationId xmlns:a16="http://schemas.microsoft.com/office/drawing/2014/main" id="{45369437-7E53-DCBA-26D6-075B65E63CCC}"/>
+              </a:ext>
+            </a:extLst>
+          </p:cNvPr>
+          <p:cNvSpPr>
+            <a:spLocks noGrp="1"/>
+          </p:cNvSpPr>
+          <p:nvPr>
+            <p:ph idx="1"/>
+          </p:nvPr>
+        </p:nvSpPr>
+        <p:spPr/>
+        <p:txBody>
+          <a:bodyPr/>
+          <a:lstStyle/>
+          <a:p>
+            <a:r>
               <a:rPr lang="de-DE" dirty="0" err="1"/>
-              <a:t>Presentation</a:t>
+              <a:t>How</a:t>
             </a:r>
             <a:r>
               <a:rPr lang="de-DE" dirty="0"/>
@@ -4714,77 +7508,36 @@
             </a:r>
             <a:r>
               <a:rPr lang="de-DE" dirty="0" err="1"/>
-              <a:t>metadata</a:t>
-            </a:r>
-            <a:endParaRPr lang="de-DE" dirty="0"/>
-          </a:p>
-        </p:txBody>
-      </p:sp>
-      <p:sp>
-        <p:nvSpPr>
-          <p:cNvPr id="3" name="Inhaltsplatzhalter 2">
-            <a:extLst>
-              <a:ext uri="{FF2B5EF4-FFF2-40B4-BE49-F238E27FC236}">
-                <a16:creationId xmlns:a16="http://schemas.microsoft.com/office/drawing/2014/main" id="{785CE866-7610-D846-8EC9-42B4A6E74904}"/>
-              </a:ext>
-            </a:extLst>
-          </p:cNvPr>
-          <p:cNvSpPr>
-            <a:spLocks noGrp="1"/>
-          </p:cNvSpPr>
-          <p:nvPr>
-            <p:ph idx="1"/>
-          </p:nvPr>
-        </p:nvSpPr>
-        <p:spPr/>
-        <p:txBody>
-          <a:bodyPr>
-            <a:normAutofit/>
-          </a:bodyPr>
-          <a:lstStyle/>
-          <a:p>
-            <a:r>
-              <a:rPr lang="de-DE" b="1" dirty="0" err="1"/>
-              <a:t>two</a:t>
-            </a:r>
-            <a:r>
-              <a:rPr lang="de-DE" b="1" dirty="0"/>
+              <a:t>to</a:t>
+            </a:r>
+            <a:r>
+              <a:rPr lang="de-DE" dirty="0"/>
               <a:t> </a:t>
             </a:r>
             <a:r>
-              <a:rPr lang="de-DE" b="1" dirty="0" err="1"/>
-              <a:t>minutes</a:t>
-            </a:r>
-            <a:r>
-              <a:rPr lang="de-DE" b="1" dirty="0"/>
-              <a:t> per </a:t>
-            </a:r>
-            <a:r>
-              <a:rPr lang="de-DE" b="1" dirty="0" err="1"/>
-              <a:t>slide</a:t>
-            </a:r>
-            <a:r>
-              <a:rPr lang="de-DE" b="1" dirty="0"/>
-              <a:t> </a:t>
-            </a:r>
-            <a:r>
-              <a:rPr lang="de-DE" b="1" dirty="0">
-                <a:sym typeface="Wingdings" panose="05000000000000000000" pitchFamily="2" charset="2"/>
-              </a:rPr>
-              <a:t> ~</a:t>
-            </a:r>
-            <a:r>
-              <a:rPr lang="de-DE" b="1">
-                <a:sym typeface="Wingdings" panose="05000000000000000000" pitchFamily="2" charset="2"/>
-              </a:rPr>
-              <a:t>12.5 Slides</a:t>
-            </a:r>
-          </a:p>
-          <a:p>
-            <a:pPr marL="0" indent="0">
-              <a:buNone/>
-            </a:pPr>
-            <a:endParaRPr lang="de-DE" b="1" dirty="0"/>
+              <a:rPr lang="de-DE" dirty="0" err="1"/>
+              <a:t>gather</a:t>
+            </a:r>
+            <a:r>
+              <a:rPr lang="de-DE" dirty="0"/>
+              <a:t> multimodal </a:t>
+            </a:r>
+            <a:r>
+              <a:rPr lang="de-DE" dirty="0" err="1"/>
+              <a:t>data</a:t>
+            </a:r>
+            <a:r>
+              <a:rPr lang="de-DE" dirty="0"/>
+              <a:t>? </a:t>
+            </a:r>
+            <a:r>
+              <a:rPr lang="de-DE" dirty="0" err="1"/>
+              <a:t>Unlabeled</a:t>
+            </a:r>
+            <a:r>
+              <a:rPr lang="de-DE" dirty="0"/>
+              <a:t>?</a:t>
+            </a:r>
           </a:p>
         </p:txBody>
       </p:sp>
@@ -4793,7 +7546,7 @@
           <p:cNvPr id="4" name="Datumsplatzhalter 3">
             <a:extLst>
               <a:ext uri="{FF2B5EF4-FFF2-40B4-BE49-F238E27FC236}">
-                <a16:creationId xmlns:a16="http://schemas.microsoft.com/office/drawing/2014/main" id="{3A3F07CD-B7D8-56ED-F1C0-AD943813A33D}"/>
+                <a16:creationId xmlns:a16="http://schemas.microsoft.com/office/drawing/2014/main" id="{ABAD0E7B-132A-BF69-A510-6938332EBE39}"/>
               </a:ext>
             </a:extLst>
           </p:cNvPr>
@@ -4822,7 +7575,7 @@
           <p:cNvPr id="5" name="Fußzeilenplatzhalter 4">
             <a:extLst>
               <a:ext uri="{FF2B5EF4-FFF2-40B4-BE49-F238E27FC236}">
-                <a16:creationId xmlns:a16="http://schemas.microsoft.com/office/drawing/2014/main" id="{BB74E4BF-436F-2407-CCA7-6DF73948D4BC}"/>
+                <a16:creationId xmlns:a16="http://schemas.microsoft.com/office/drawing/2014/main" id="{E04622A9-CA87-4F5E-4E1F-089E80783164}"/>
               </a:ext>
             </a:extLst>
           </p:cNvPr>
@@ -4851,7 +7604,7 @@
           <p:cNvPr id="6" name="Foliennummernplatzhalter 5">
             <a:extLst>
               <a:ext uri="{FF2B5EF4-FFF2-40B4-BE49-F238E27FC236}">
-                <a16:creationId xmlns:a16="http://schemas.microsoft.com/office/drawing/2014/main" id="{168096F9-3FB5-0C55-D6F4-1BCA6D935B80}"/>
+                <a16:creationId xmlns:a16="http://schemas.microsoft.com/office/drawing/2014/main" id="{4932E1E5-FE2C-D226-A6BD-134E35334C0C}"/>
               </a:ext>
             </a:extLst>
           </p:cNvPr>
@@ -4878,7 +7631,880 @@
     </p:spTree>
     <p:extLst>
       <p:ext uri="{BB962C8B-B14F-4D97-AF65-F5344CB8AC3E}">
-        <p14:creationId xmlns:p14="http://schemas.microsoft.com/office/powerpoint/2010/main" val="2915824135"/>
+        <p14:creationId xmlns:p14="http://schemas.microsoft.com/office/powerpoint/2010/main" val="1348313613"/>
+      </p:ext>
+    </p:extLst>
+  </p:cSld>
+  <p:clrMapOvr>
+    <a:masterClrMapping/>
+  </p:clrMapOvr>
+</p:sld>
+</file>
+
+<file path=ppt/slides/slide6.xml><?xml version="1.0" encoding="utf-8"?>
+<p:sld xmlns:a="http://schemas.openxmlformats.org/drawingml/2006/main" xmlns:r="http://schemas.openxmlformats.org/officeDocument/2006/relationships" xmlns:p="http://schemas.openxmlformats.org/presentationml/2006/main">
+  <p:cSld>
+    <p:spTree>
+      <p:nvGrpSpPr>
+        <p:cNvPr id="1" name=""/>
+        <p:cNvGrpSpPr/>
+        <p:nvPr/>
+      </p:nvGrpSpPr>
+      <p:grpSpPr>
+        <a:xfrm>
+          <a:off x="0" y="0"/>
+          <a:ext cx="0" cy="0"/>
+          <a:chOff x="0" y="0"/>
+          <a:chExt cx="0" cy="0"/>
+        </a:xfrm>
+      </p:grpSpPr>
+      <p:sp>
+        <p:nvSpPr>
+          <p:cNvPr id="2" name="Titel 1">
+            <a:extLst>
+              <a:ext uri="{FF2B5EF4-FFF2-40B4-BE49-F238E27FC236}">
+                <a16:creationId xmlns:a16="http://schemas.microsoft.com/office/drawing/2014/main" id="{16FE91E3-A377-8F7F-1F2D-9A7FCA6AD26F}"/>
+              </a:ext>
+            </a:extLst>
+          </p:cNvPr>
+          <p:cNvSpPr>
+            <a:spLocks noGrp="1"/>
+          </p:cNvSpPr>
+          <p:nvPr>
+            <p:ph type="title"/>
+          </p:nvPr>
+        </p:nvSpPr>
+        <p:spPr/>
+        <p:txBody>
+          <a:bodyPr/>
+          <a:lstStyle/>
+          <a:p>
+            <a:r>
+              <a:rPr lang="de-DE" dirty="0" err="1"/>
+              <a:t>Pre</a:t>
+            </a:r>
+            <a:r>
+              <a:rPr lang="de-DE" dirty="0"/>
+              <a:t>-training and Fine-tuning</a:t>
+            </a:r>
+          </a:p>
+        </p:txBody>
+      </p:sp>
+      <p:sp>
+        <p:nvSpPr>
+          <p:cNvPr id="3" name="Inhaltsplatzhalter 2">
+            <a:extLst>
+              <a:ext uri="{FF2B5EF4-FFF2-40B4-BE49-F238E27FC236}">
+                <a16:creationId xmlns:a16="http://schemas.microsoft.com/office/drawing/2014/main" id="{271E43AB-1111-4B2E-312E-B49CA654A00B}"/>
+              </a:ext>
+            </a:extLst>
+          </p:cNvPr>
+          <p:cNvSpPr>
+            <a:spLocks noGrp="1"/>
+          </p:cNvSpPr>
+          <p:nvPr>
+            <p:ph idx="1"/>
+          </p:nvPr>
+        </p:nvSpPr>
+        <p:spPr/>
+        <p:txBody>
+          <a:bodyPr/>
+          <a:lstStyle/>
+          <a:p>
+            <a:r>
+              <a:rPr lang="de-DE" dirty="0" err="1"/>
+              <a:t>Pre</a:t>
+            </a:r>
+            <a:r>
+              <a:rPr lang="de-DE" dirty="0"/>
+              <a:t>-training: (</a:t>
+            </a:r>
+            <a:r>
+              <a:rPr lang="de-DE" dirty="0" err="1"/>
+              <a:t>explanation</a:t>
+            </a:r>
+            <a:r>
+              <a:rPr lang="de-DE" dirty="0"/>
+              <a:t>) </a:t>
+            </a:r>
+            <a:r>
+              <a:rPr lang="de-DE" dirty="0" err="1"/>
+              <a:t>infer</a:t>
+            </a:r>
+            <a:r>
+              <a:rPr lang="de-DE" dirty="0"/>
+              <a:t> </a:t>
+            </a:r>
+            <a:r>
+              <a:rPr lang="de-DE" dirty="0" err="1"/>
+              <a:t>speech</a:t>
+            </a:r>
+            <a:r>
+              <a:rPr lang="de-DE" dirty="0"/>
+              <a:t> </a:t>
+            </a:r>
+            <a:r>
+              <a:rPr lang="de-DE" dirty="0" err="1"/>
+              <a:t>representation</a:t>
+            </a:r>
+            <a:endParaRPr lang="de-DE" dirty="0"/>
+          </a:p>
+          <a:p>
+            <a:r>
+              <a:rPr lang="de-DE" dirty="0"/>
+              <a:t>Fine-tuning: (</a:t>
+            </a:r>
+            <a:r>
+              <a:rPr lang="de-DE" dirty="0" err="1"/>
+              <a:t>name</a:t>
+            </a:r>
+            <a:r>
+              <a:rPr lang="de-DE" dirty="0"/>
+              <a:t> / </a:t>
+            </a:r>
+            <a:r>
+              <a:rPr lang="de-DE" dirty="0" err="1"/>
+              <a:t>explain</a:t>
+            </a:r>
+            <a:r>
+              <a:rPr lang="de-DE" dirty="0"/>
+              <a:t> </a:t>
+            </a:r>
+            <a:r>
+              <a:rPr lang="de-DE" dirty="0" err="1"/>
+              <a:t>examples</a:t>
+            </a:r>
+            <a:r>
+              <a:rPr lang="de-DE" dirty="0"/>
+              <a:t>): ASR/VSR/AVSR</a:t>
+            </a:r>
+          </a:p>
+        </p:txBody>
+      </p:sp>
+      <p:sp>
+        <p:nvSpPr>
+          <p:cNvPr id="4" name="Datumsplatzhalter 3">
+            <a:extLst>
+              <a:ext uri="{FF2B5EF4-FFF2-40B4-BE49-F238E27FC236}">
+                <a16:creationId xmlns:a16="http://schemas.microsoft.com/office/drawing/2014/main" id="{25212BE2-A1F4-3DB8-093D-0DF860D93D7E}"/>
+              </a:ext>
+            </a:extLst>
+          </p:cNvPr>
+          <p:cNvSpPr>
+            <a:spLocks noGrp="1"/>
+          </p:cNvSpPr>
+          <p:nvPr>
+            <p:ph type="dt" sz="half" idx="10"/>
+          </p:nvPr>
+        </p:nvSpPr>
+        <p:spPr/>
+        <p:txBody>
+          <a:bodyPr/>
+          <a:lstStyle/>
+          <a:p>
+            <a:r>
+              <a:rPr lang="de-DE"/>
+              <a:t>05.12.2023</a:t>
+            </a:r>
+            <a:endParaRPr lang="de-DE" dirty="0"/>
+          </a:p>
+        </p:txBody>
+      </p:sp>
+      <p:sp>
+        <p:nvSpPr>
+          <p:cNvPr id="5" name="Fußzeilenplatzhalter 4">
+            <a:extLst>
+              <a:ext uri="{FF2B5EF4-FFF2-40B4-BE49-F238E27FC236}">
+                <a16:creationId xmlns:a16="http://schemas.microsoft.com/office/drawing/2014/main" id="{5A10E6A1-C128-F86D-E82F-AB31572F7A8C}"/>
+              </a:ext>
+            </a:extLst>
+          </p:cNvPr>
+          <p:cNvSpPr>
+            <a:spLocks noGrp="1"/>
+          </p:cNvSpPr>
+          <p:nvPr>
+            <p:ph type="ftr" sz="quarter" idx="11"/>
+          </p:nvPr>
+        </p:nvSpPr>
+        <p:spPr/>
+        <p:txBody>
+          <a:bodyPr/>
+          <a:lstStyle/>
+          <a:p>
+            <a:r>
+              <a:rPr lang="en-US"/>
+              <a:t>Multi-modal Speech Representation Learning</a:t>
+            </a:r>
+            <a:endParaRPr lang="de-DE" dirty="0"/>
+          </a:p>
+        </p:txBody>
+      </p:sp>
+      <p:sp>
+        <p:nvSpPr>
+          <p:cNvPr id="6" name="Foliennummernplatzhalter 5">
+            <a:extLst>
+              <a:ext uri="{FF2B5EF4-FFF2-40B4-BE49-F238E27FC236}">
+                <a16:creationId xmlns:a16="http://schemas.microsoft.com/office/drawing/2014/main" id="{9DE41329-F27B-D0C7-B0CC-67DE93BCAA5B}"/>
+              </a:ext>
+            </a:extLst>
+          </p:cNvPr>
+          <p:cNvSpPr>
+            <a:spLocks noGrp="1"/>
+          </p:cNvSpPr>
+          <p:nvPr>
+            <p:ph type="sldNum" sz="quarter" idx="12"/>
+          </p:nvPr>
+        </p:nvSpPr>
+        <p:spPr/>
+        <p:txBody>
+          <a:bodyPr/>
+          <a:lstStyle/>
+          <a:p>
+            <a:fld id="{4589C08E-11F1-4614-AD94-2F79D605AB8D}" type="slidenum">
+              <a:rPr lang="de-DE" smtClean="0"/>
+              <a:t>6</a:t>
+            </a:fld>
+            <a:endParaRPr lang="de-DE" dirty="0"/>
+          </a:p>
+        </p:txBody>
+      </p:sp>
+    </p:spTree>
+    <p:extLst>
+      <p:ext uri="{BB962C8B-B14F-4D97-AF65-F5344CB8AC3E}">
+        <p14:creationId xmlns:p14="http://schemas.microsoft.com/office/powerpoint/2010/main" val="3963046836"/>
+      </p:ext>
+    </p:extLst>
+  </p:cSld>
+  <p:clrMapOvr>
+    <a:masterClrMapping/>
+  </p:clrMapOvr>
+</p:sld>
+</file>
+
+<file path=ppt/slides/slide7.xml><?xml version="1.0" encoding="utf-8"?>
+<p:sld xmlns:a="http://schemas.openxmlformats.org/drawingml/2006/main" xmlns:r="http://schemas.openxmlformats.org/officeDocument/2006/relationships" xmlns:p="http://schemas.openxmlformats.org/presentationml/2006/main">
+  <p:cSld>
+    <p:spTree>
+      <p:nvGrpSpPr>
+        <p:cNvPr id="1" name=""/>
+        <p:cNvGrpSpPr/>
+        <p:nvPr/>
+      </p:nvGrpSpPr>
+      <p:grpSpPr>
+        <a:xfrm>
+          <a:off x="0" y="0"/>
+          <a:ext cx="0" cy="0"/>
+          <a:chOff x="0" y="0"/>
+          <a:chExt cx="0" cy="0"/>
+        </a:xfrm>
+      </p:grpSpPr>
+      <p:sp>
+        <p:nvSpPr>
+          <p:cNvPr id="2" name="Titel 1">
+            <a:extLst>
+              <a:ext uri="{FF2B5EF4-FFF2-40B4-BE49-F238E27FC236}">
+                <a16:creationId xmlns:a16="http://schemas.microsoft.com/office/drawing/2014/main" id="{6967BD36-9BE1-9E11-2419-09EE0FB8BF17}"/>
+              </a:ext>
+            </a:extLst>
+          </p:cNvPr>
+          <p:cNvSpPr>
+            <a:spLocks noGrp="1"/>
+          </p:cNvSpPr>
+          <p:nvPr>
+            <p:ph type="title"/>
+          </p:nvPr>
+        </p:nvSpPr>
+        <p:spPr/>
+        <p:txBody>
+          <a:bodyPr/>
+          <a:lstStyle/>
+          <a:p>
+            <a:r>
+              <a:rPr lang="de-DE" dirty="0"/>
+              <a:t>Learning </a:t>
+            </a:r>
+            <a:r>
+              <a:rPr lang="de-DE" dirty="0" err="1"/>
+              <a:t>Paradigms</a:t>
+            </a:r>
+            <a:r>
+              <a:rPr lang="de-DE" dirty="0"/>
+              <a:t> of SRL</a:t>
+            </a:r>
+          </a:p>
+        </p:txBody>
+      </p:sp>
+      <p:sp>
+        <p:nvSpPr>
+          <p:cNvPr id="3" name="Inhaltsplatzhalter 2">
+            <a:extLst>
+              <a:ext uri="{FF2B5EF4-FFF2-40B4-BE49-F238E27FC236}">
+                <a16:creationId xmlns:a16="http://schemas.microsoft.com/office/drawing/2014/main" id="{5F605907-84CB-5A07-5B52-58273FC86B50}"/>
+              </a:ext>
+            </a:extLst>
+          </p:cNvPr>
+          <p:cNvSpPr>
+            <a:spLocks noGrp="1"/>
+          </p:cNvSpPr>
+          <p:nvPr>
+            <p:ph idx="1"/>
+          </p:nvPr>
+        </p:nvSpPr>
+        <p:spPr/>
+        <p:txBody>
+          <a:bodyPr/>
+          <a:lstStyle/>
+          <a:p>
+            <a:r>
+              <a:rPr lang="de-DE" dirty="0"/>
+              <a:t>Generative/…</a:t>
+            </a:r>
+          </a:p>
+          <a:p>
+            <a:r>
+              <a:rPr lang="de-DE" dirty="0" err="1"/>
+              <a:t>Intrinsic</a:t>
+            </a:r>
+            <a:r>
+              <a:rPr lang="de-DE" dirty="0"/>
+              <a:t>/</a:t>
+            </a:r>
+            <a:r>
+              <a:rPr lang="de-DE" dirty="0" err="1"/>
+              <a:t>Extrinsic</a:t>
+            </a:r>
+            <a:endParaRPr lang="de-DE" dirty="0"/>
+          </a:p>
+        </p:txBody>
+      </p:sp>
+      <p:sp>
+        <p:nvSpPr>
+          <p:cNvPr id="4" name="Datumsplatzhalter 3">
+            <a:extLst>
+              <a:ext uri="{FF2B5EF4-FFF2-40B4-BE49-F238E27FC236}">
+                <a16:creationId xmlns:a16="http://schemas.microsoft.com/office/drawing/2014/main" id="{B1B29855-1D3B-F04B-EB6A-E10C8CCAEBEF}"/>
+              </a:ext>
+            </a:extLst>
+          </p:cNvPr>
+          <p:cNvSpPr>
+            <a:spLocks noGrp="1"/>
+          </p:cNvSpPr>
+          <p:nvPr>
+            <p:ph type="dt" sz="half" idx="10"/>
+          </p:nvPr>
+        </p:nvSpPr>
+        <p:spPr/>
+        <p:txBody>
+          <a:bodyPr/>
+          <a:lstStyle/>
+          <a:p>
+            <a:r>
+              <a:rPr lang="de-DE"/>
+              <a:t>05.12.2023</a:t>
+            </a:r>
+            <a:endParaRPr lang="de-DE" dirty="0"/>
+          </a:p>
+        </p:txBody>
+      </p:sp>
+      <p:sp>
+        <p:nvSpPr>
+          <p:cNvPr id="5" name="Fußzeilenplatzhalter 4">
+            <a:extLst>
+              <a:ext uri="{FF2B5EF4-FFF2-40B4-BE49-F238E27FC236}">
+                <a16:creationId xmlns:a16="http://schemas.microsoft.com/office/drawing/2014/main" id="{4CACE1B6-89F7-2115-CE62-C6E4DDF5E688}"/>
+              </a:ext>
+            </a:extLst>
+          </p:cNvPr>
+          <p:cNvSpPr>
+            <a:spLocks noGrp="1"/>
+          </p:cNvSpPr>
+          <p:nvPr>
+            <p:ph type="ftr" sz="quarter" idx="11"/>
+          </p:nvPr>
+        </p:nvSpPr>
+        <p:spPr/>
+        <p:txBody>
+          <a:bodyPr/>
+          <a:lstStyle/>
+          <a:p>
+            <a:r>
+              <a:rPr lang="en-US"/>
+              <a:t>Multi-modal Speech Representation Learning</a:t>
+            </a:r>
+            <a:endParaRPr lang="de-DE" dirty="0"/>
+          </a:p>
+        </p:txBody>
+      </p:sp>
+      <p:sp>
+        <p:nvSpPr>
+          <p:cNvPr id="6" name="Foliennummernplatzhalter 5">
+            <a:extLst>
+              <a:ext uri="{FF2B5EF4-FFF2-40B4-BE49-F238E27FC236}">
+                <a16:creationId xmlns:a16="http://schemas.microsoft.com/office/drawing/2014/main" id="{B430318A-605C-C70B-5C8A-E2CAB8FCDBDA}"/>
+              </a:ext>
+            </a:extLst>
+          </p:cNvPr>
+          <p:cNvSpPr>
+            <a:spLocks noGrp="1"/>
+          </p:cNvSpPr>
+          <p:nvPr>
+            <p:ph type="sldNum" sz="quarter" idx="12"/>
+          </p:nvPr>
+        </p:nvSpPr>
+        <p:spPr/>
+        <p:txBody>
+          <a:bodyPr/>
+          <a:lstStyle/>
+          <a:p>
+            <a:fld id="{4589C08E-11F1-4614-AD94-2F79D605AB8D}" type="slidenum">
+              <a:rPr lang="de-DE" smtClean="0"/>
+              <a:t>7</a:t>
+            </a:fld>
+            <a:endParaRPr lang="de-DE" dirty="0"/>
+          </a:p>
+        </p:txBody>
+      </p:sp>
+    </p:spTree>
+    <p:extLst>
+      <p:ext uri="{BB962C8B-B14F-4D97-AF65-F5344CB8AC3E}">
+        <p14:creationId xmlns:p14="http://schemas.microsoft.com/office/powerpoint/2010/main" val="2319361575"/>
+      </p:ext>
+    </p:extLst>
+  </p:cSld>
+  <p:clrMapOvr>
+    <a:masterClrMapping/>
+  </p:clrMapOvr>
+</p:sld>
+</file>
+
+<file path=ppt/slides/slide8.xml><?xml version="1.0" encoding="utf-8"?>
+<p:sld xmlns:a="http://schemas.openxmlformats.org/drawingml/2006/main" xmlns:r="http://schemas.openxmlformats.org/officeDocument/2006/relationships" xmlns:p="http://schemas.openxmlformats.org/presentationml/2006/main">
+  <p:cSld>
+    <p:spTree>
+      <p:nvGrpSpPr>
+        <p:cNvPr id="1" name=""/>
+        <p:cNvGrpSpPr/>
+        <p:nvPr/>
+      </p:nvGrpSpPr>
+      <p:grpSpPr>
+        <a:xfrm>
+          <a:off x="0" y="0"/>
+          <a:ext cx="0" cy="0"/>
+          <a:chOff x="0" y="0"/>
+          <a:chExt cx="0" cy="0"/>
+        </a:xfrm>
+      </p:grpSpPr>
+      <p:sp>
+        <p:nvSpPr>
+          <p:cNvPr id="2" name="Titel 1">
+            <a:extLst>
+              <a:ext uri="{FF2B5EF4-FFF2-40B4-BE49-F238E27FC236}">
+                <a16:creationId xmlns:a16="http://schemas.microsoft.com/office/drawing/2014/main" id="{8C4D5918-58C4-9A1A-72ED-08A5D498DEA7}"/>
+              </a:ext>
+            </a:extLst>
+          </p:cNvPr>
+          <p:cNvSpPr>
+            <a:spLocks noGrp="1"/>
+          </p:cNvSpPr>
+          <p:nvPr>
+            <p:ph type="title"/>
+          </p:nvPr>
+        </p:nvSpPr>
+        <p:spPr/>
+        <p:txBody>
+          <a:bodyPr/>
+          <a:lstStyle/>
+          <a:p>
+            <a:r>
+              <a:rPr lang="de-DE" dirty="0"/>
+              <a:t>Single-mode </a:t>
+            </a:r>
+            <a:r>
+              <a:rPr lang="de-DE" dirty="0" err="1"/>
+              <a:t>approaches</a:t>
+            </a:r>
+            <a:endParaRPr lang="de-DE" dirty="0"/>
+          </a:p>
+        </p:txBody>
+      </p:sp>
+      <p:sp>
+        <p:nvSpPr>
+          <p:cNvPr id="3" name="Inhaltsplatzhalter 2">
+            <a:extLst>
+              <a:ext uri="{FF2B5EF4-FFF2-40B4-BE49-F238E27FC236}">
+                <a16:creationId xmlns:a16="http://schemas.microsoft.com/office/drawing/2014/main" id="{AC7E29A0-6A42-D439-44FF-E5C1BB0BB253}"/>
+              </a:ext>
+            </a:extLst>
+          </p:cNvPr>
+          <p:cNvSpPr>
+            <a:spLocks noGrp="1"/>
+          </p:cNvSpPr>
+          <p:nvPr>
+            <p:ph idx="1"/>
+          </p:nvPr>
+        </p:nvSpPr>
+        <p:spPr/>
+        <p:txBody>
+          <a:bodyPr/>
+          <a:lstStyle/>
+          <a:p>
+            <a:r>
+              <a:rPr lang="de-DE" dirty="0"/>
+              <a:t>Show </a:t>
+            </a:r>
+            <a:r>
+              <a:rPr lang="de-DE" dirty="0" err="1"/>
+              <a:t>single</a:t>
+            </a:r>
+            <a:r>
+              <a:rPr lang="de-DE" dirty="0"/>
+              <a:t> </a:t>
+            </a:r>
+            <a:r>
+              <a:rPr lang="de-DE" dirty="0" err="1"/>
+              <a:t>mode</a:t>
+            </a:r>
+            <a:r>
+              <a:rPr lang="de-DE" dirty="0"/>
+              <a:t> </a:t>
+            </a:r>
+            <a:r>
+              <a:rPr lang="de-DE" dirty="0" err="1"/>
+              <a:t>approaches</a:t>
+            </a:r>
+            <a:r>
+              <a:rPr lang="de-DE" dirty="0"/>
+              <a:t> (review </a:t>
+            </a:r>
+            <a:r>
+              <a:rPr lang="de-DE" dirty="0" err="1"/>
+              <a:t>paper</a:t>
+            </a:r>
+            <a:r>
+              <a:rPr lang="de-DE" dirty="0"/>
+              <a:t>)</a:t>
+            </a:r>
+          </a:p>
+          <a:p>
+            <a:r>
+              <a:rPr lang="de-DE" dirty="0" err="1"/>
+              <a:t>HuBERT</a:t>
+            </a:r>
+            <a:endParaRPr lang="de-DE" dirty="0"/>
+          </a:p>
+          <a:p>
+            <a:r>
+              <a:rPr lang="de-DE" dirty="0"/>
+              <a:t>wav2vec</a:t>
+            </a:r>
+          </a:p>
+        </p:txBody>
+      </p:sp>
+      <p:sp>
+        <p:nvSpPr>
+          <p:cNvPr id="4" name="Datumsplatzhalter 3">
+            <a:extLst>
+              <a:ext uri="{FF2B5EF4-FFF2-40B4-BE49-F238E27FC236}">
+                <a16:creationId xmlns:a16="http://schemas.microsoft.com/office/drawing/2014/main" id="{3A207044-445B-8A71-6FDA-7C1B54679F7C}"/>
+              </a:ext>
+            </a:extLst>
+          </p:cNvPr>
+          <p:cNvSpPr>
+            <a:spLocks noGrp="1"/>
+          </p:cNvSpPr>
+          <p:nvPr>
+            <p:ph type="dt" sz="half" idx="10"/>
+          </p:nvPr>
+        </p:nvSpPr>
+        <p:spPr/>
+        <p:txBody>
+          <a:bodyPr/>
+          <a:lstStyle/>
+          <a:p>
+            <a:r>
+              <a:rPr lang="de-DE"/>
+              <a:t>05.12.2023</a:t>
+            </a:r>
+            <a:endParaRPr lang="de-DE" dirty="0"/>
+          </a:p>
+        </p:txBody>
+      </p:sp>
+      <p:sp>
+        <p:nvSpPr>
+          <p:cNvPr id="5" name="Fußzeilenplatzhalter 4">
+            <a:extLst>
+              <a:ext uri="{FF2B5EF4-FFF2-40B4-BE49-F238E27FC236}">
+                <a16:creationId xmlns:a16="http://schemas.microsoft.com/office/drawing/2014/main" id="{D8A631EC-F945-1CFF-CC1F-4B965475D8D9}"/>
+              </a:ext>
+            </a:extLst>
+          </p:cNvPr>
+          <p:cNvSpPr>
+            <a:spLocks noGrp="1"/>
+          </p:cNvSpPr>
+          <p:nvPr>
+            <p:ph type="ftr" sz="quarter" idx="11"/>
+          </p:nvPr>
+        </p:nvSpPr>
+        <p:spPr/>
+        <p:txBody>
+          <a:bodyPr/>
+          <a:lstStyle/>
+          <a:p>
+            <a:r>
+              <a:rPr lang="en-US"/>
+              <a:t>Multi-modal Speech Representation Learning</a:t>
+            </a:r>
+            <a:endParaRPr lang="de-DE" dirty="0"/>
+          </a:p>
+        </p:txBody>
+      </p:sp>
+      <p:sp>
+        <p:nvSpPr>
+          <p:cNvPr id="6" name="Foliennummernplatzhalter 5">
+            <a:extLst>
+              <a:ext uri="{FF2B5EF4-FFF2-40B4-BE49-F238E27FC236}">
+                <a16:creationId xmlns:a16="http://schemas.microsoft.com/office/drawing/2014/main" id="{433A7482-7144-853C-2316-41B365C312DE}"/>
+              </a:ext>
+            </a:extLst>
+          </p:cNvPr>
+          <p:cNvSpPr>
+            <a:spLocks noGrp="1"/>
+          </p:cNvSpPr>
+          <p:nvPr>
+            <p:ph type="sldNum" sz="quarter" idx="12"/>
+          </p:nvPr>
+        </p:nvSpPr>
+        <p:spPr/>
+        <p:txBody>
+          <a:bodyPr/>
+          <a:lstStyle/>
+          <a:p>
+            <a:fld id="{4589C08E-11F1-4614-AD94-2F79D605AB8D}" type="slidenum">
+              <a:rPr lang="de-DE" smtClean="0"/>
+              <a:t>8</a:t>
+            </a:fld>
+            <a:endParaRPr lang="de-DE" dirty="0"/>
+          </a:p>
+        </p:txBody>
+      </p:sp>
+    </p:spTree>
+    <p:extLst>
+      <p:ext uri="{BB962C8B-B14F-4D97-AF65-F5344CB8AC3E}">
+        <p14:creationId xmlns:p14="http://schemas.microsoft.com/office/powerpoint/2010/main" val="2222725949"/>
+      </p:ext>
+    </p:extLst>
+  </p:cSld>
+  <p:clrMapOvr>
+    <a:masterClrMapping/>
+  </p:clrMapOvr>
+</p:sld>
+</file>
+
+<file path=ppt/slides/slide9.xml><?xml version="1.0" encoding="utf-8"?>
+<p:sld xmlns:a="http://schemas.openxmlformats.org/drawingml/2006/main" xmlns:r="http://schemas.openxmlformats.org/officeDocument/2006/relationships" xmlns:p="http://schemas.openxmlformats.org/presentationml/2006/main">
+  <p:cSld>
+    <p:spTree>
+      <p:nvGrpSpPr>
+        <p:cNvPr id="1" name=""/>
+        <p:cNvGrpSpPr/>
+        <p:nvPr/>
+      </p:nvGrpSpPr>
+      <p:grpSpPr>
+        <a:xfrm>
+          <a:off x="0" y="0"/>
+          <a:ext cx="0" cy="0"/>
+          <a:chOff x="0" y="0"/>
+          <a:chExt cx="0" cy="0"/>
+        </a:xfrm>
+      </p:grpSpPr>
+      <p:sp>
+        <p:nvSpPr>
+          <p:cNvPr id="2" name="Titel 1">
+            <a:extLst>
+              <a:ext uri="{FF2B5EF4-FFF2-40B4-BE49-F238E27FC236}">
+                <a16:creationId xmlns:a16="http://schemas.microsoft.com/office/drawing/2014/main" id="{76E5DC35-592D-DF43-D5BB-5CA89E898473}"/>
+              </a:ext>
+            </a:extLst>
+          </p:cNvPr>
+          <p:cNvSpPr>
+            <a:spLocks noGrp="1"/>
+          </p:cNvSpPr>
+          <p:nvPr>
+            <p:ph type="title"/>
+          </p:nvPr>
+        </p:nvSpPr>
+        <p:spPr/>
+        <p:txBody>
+          <a:bodyPr/>
+          <a:lstStyle/>
+          <a:p>
+            <a:r>
+              <a:rPr lang="de-DE" dirty="0"/>
+              <a:t>Multi-mode </a:t>
+            </a:r>
+            <a:r>
+              <a:rPr lang="de-DE" dirty="0" err="1"/>
+              <a:t>approaches</a:t>
+            </a:r>
+            <a:endParaRPr lang="de-DE" dirty="0"/>
+          </a:p>
+        </p:txBody>
+      </p:sp>
+      <p:sp>
+        <p:nvSpPr>
+          <p:cNvPr id="3" name="Inhaltsplatzhalter 2">
+            <a:extLst>
+              <a:ext uri="{FF2B5EF4-FFF2-40B4-BE49-F238E27FC236}">
+                <a16:creationId xmlns:a16="http://schemas.microsoft.com/office/drawing/2014/main" id="{928E4F7D-931D-926F-B741-6F79889F81AB}"/>
+              </a:ext>
+            </a:extLst>
+          </p:cNvPr>
+          <p:cNvSpPr>
+            <a:spLocks noGrp="1"/>
+          </p:cNvSpPr>
+          <p:nvPr>
+            <p:ph idx="1"/>
+          </p:nvPr>
+        </p:nvSpPr>
+        <p:spPr/>
+        <p:txBody>
+          <a:bodyPr/>
+          <a:lstStyle/>
+          <a:p>
+            <a:r>
+              <a:rPr lang="de-DE" dirty="0"/>
+              <a:t>…</a:t>
+            </a:r>
+          </a:p>
+          <a:p>
+            <a:r>
+              <a:rPr lang="de-DE" dirty="0" err="1"/>
+              <a:t>Later</a:t>
+            </a:r>
+            <a:r>
+              <a:rPr lang="de-DE" dirty="0"/>
+              <a:t>:</a:t>
+            </a:r>
+          </a:p>
+          <a:p>
+            <a:pPr lvl="1"/>
+            <a:r>
+              <a:rPr lang="de-DE" dirty="0"/>
+              <a:t>SpeechT5</a:t>
+            </a:r>
+          </a:p>
+          <a:p>
+            <a:pPr lvl="1"/>
+            <a:r>
+              <a:rPr lang="de-DE" dirty="0"/>
+              <a:t>VAT LM</a:t>
+            </a:r>
+          </a:p>
+          <a:p>
+            <a:pPr lvl="1"/>
+            <a:r>
+              <a:rPr lang="de-DE" dirty="0"/>
+              <a:t>AV-</a:t>
+            </a:r>
+            <a:r>
+              <a:rPr lang="de-DE" dirty="0" err="1"/>
+              <a:t>HuBERT</a:t>
+            </a:r>
+            <a:endParaRPr lang="de-DE" dirty="0"/>
+          </a:p>
+        </p:txBody>
+      </p:sp>
+      <p:sp>
+        <p:nvSpPr>
+          <p:cNvPr id="4" name="Datumsplatzhalter 3">
+            <a:extLst>
+              <a:ext uri="{FF2B5EF4-FFF2-40B4-BE49-F238E27FC236}">
+                <a16:creationId xmlns:a16="http://schemas.microsoft.com/office/drawing/2014/main" id="{8FDF3430-D6A3-AC0A-F68D-97C6E99A3A70}"/>
+              </a:ext>
+            </a:extLst>
+          </p:cNvPr>
+          <p:cNvSpPr>
+            <a:spLocks noGrp="1"/>
+          </p:cNvSpPr>
+          <p:nvPr>
+            <p:ph type="dt" sz="half" idx="10"/>
+          </p:nvPr>
+        </p:nvSpPr>
+        <p:spPr/>
+        <p:txBody>
+          <a:bodyPr/>
+          <a:lstStyle/>
+          <a:p>
+            <a:r>
+              <a:rPr lang="de-DE"/>
+              <a:t>05.12.2023</a:t>
+            </a:r>
+            <a:endParaRPr lang="de-DE" dirty="0"/>
+          </a:p>
+        </p:txBody>
+      </p:sp>
+      <p:sp>
+        <p:nvSpPr>
+          <p:cNvPr id="5" name="Fußzeilenplatzhalter 4">
+            <a:extLst>
+              <a:ext uri="{FF2B5EF4-FFF2-40B4-BE49-F238E27FC236}">
+                <a16:creationId xmlns:a16="http://schemas.microsoft.com/office/drawing/2014/main" id="{C3CF2A04-25D3-5150-F8CE-D4433F71CB91}"/>
+              </a:ext>
+            </a:extLst>
+          </p:cNvPr>
+          <p:cNvSpPr>
+            <a:spLocks noGrp="1"/>
+          </p:cNvSpPr>
+          <p:nvPr>
+            <p:ph type="ftr" sz="quarter" idx="11"/>
+          </p:nvPr>
+        </p:nvSpPr>
+        <p:spPr/>
+        <p:txBody>
+          <a:bodyPr/>
+          <a:lstStyle/>
+          <a:p>
+            <a:r>
+              <a:rPr lang="en-US"/>
+              <a:t>Multi-modal Speech Representation Learning</a:t>
+            </a:r>
+            <a:endParaRPr lang="de-DE" dirty="0"/>
+          </a:p>
+        </p:txBody>
+      </p:sp>
+      <p:sp>
+        <p:nvSpPr>
+          <p:cNvPr id="6" name="Foliennummernplatzhalter 5">
+            <a:extLst>
+              <a:ext uri="{FF2B5EF4-FFF2-40B4-BE49-F238E27FC236}">
+                <a16:creationId xmlns:a16="http://schemas.microsoft.com/office/drawing/2014/main" id="{C3D2D74F-AAB3-4183-3522-7B2E02E5BAD9}"/>
+              </a:ext>
+            </a:extLst>
+          </p:cNvPr>
+          <p:cNvSpPr>
+            <a:spLocks noGrp="1"/>
+          </p:cNvSpPr>
+          <p:nvPr>
+            <p:ph type="sldNum" sz="quarter" idx="12"/>
+          </p:nvPr>
+        </p:nvSpPr>
+        <p:spPr/>
+        <p:txBody>
+          <a:bodyPr/>
+          <a:lstStyle/>
+          <a:p>
+            <a:fld id="{4589C08E-11F1-4614-AD94-2F79D605AB8D}" type="slidenum">
+              <a:rPr lang="de-DE" smtClean="0"/>
+              <a:t>9</a:t>
+            </a:fld>
+            <a:endParaRPr lang="de-DE" dirty="0"/>
+          </a:p>
+        </p:txBody>
+      </p:sp>
+    </p:spTree>
+    <p:extLst>
+      <p:ext uri="{BB962C8B-B14F-4D97-AF65-F5344CB8AC3E}">
+        <p14:creationId xmlns:p14="http://schemas.microsoft.com/office/powerpoint/2010/main" val="425188991"/>
       </p:ext>
     </p:extLst>
   </p:cSld>

</xml_diff>